<commit_message>
Features selected plot was updated
</commit_message>
<xml_diff>
--- a/BREAST CANCER - final.pptx
+++ b/BREAST CANCER - final.pptx
@@ -19,6 +19,8 @@
     <p:sldId id="264" r:id="rId14"/>
     <p:sldId id="265" r:id="rId15"/>
     <p:sldId id="266" r:id="rId16"/>
+    <p:sldId id="267" r:id="rId17"/>
+    <p:sldId id="268" r:id="rId18"/>
   </p:sldIdLst>
   <p:sldSz cy="5143500" cx="9144000"/>
   <p:notesSz cx="6858000" cy="9144000"/>
@@ -814,7 +816,7 @@
       </p:grpSpPr>
       <p:sp>
         <p:nvSpPr>
-          <p:cNvPr id="136" name="Google Shape;136;g20dafdbd006_0_44:notes"/>
+          <p:cNvPr id="136" name="Google Shape;136;g20dafdbd006_0_119:notes"/>
           <p:cNvSpPr/>
           <p:nvPr>
             <p:ph idx="2" type="sldImg"/>
@@ -849,7 +851,7 @@
       </p:sp>
       <p:sp>
         <p:nvSpPr>
-          <p:cNvPr id="137" name="Google Shape;137;g20dafdbd006_0_44:notes"/>
+          <p:cNvPr id="137" name="Google Shape;137;g20dafdbd006_0_119:notes"/>
           <p:cNvSpPr txBox="1"/>
           <p:nvPr>
             <p:ph idx="1" type="body"/>
@@ -899,7 +901,7 @@
   <p:cSld>
     <p:spTree>
       <p:nvGrpSpPr>
-        <p:cNvPr id="140" name="Shape 140"/>
+        <p:cNvPr id="142" name="Shape 142"/>
         <p:cNvGrpSpPr/>
         <p:nvPr/>
       </p:nvGrpSpPr>
@@ -913,7 +915,7 @@
       </p:grpSpPr>
       <p:sp>
         <p:nvSpPr>
-          <p:cNvPr id="141" name="Google Shape;141;g20dafdbd006_0_65:notes"/>
+          <p:cNvPr id="143" name="Google Shape;143;g20dafdbd006_0_44:notes"/>
           <p:cNvSpPr/>
           <p:nvPr>
             <p:ph idx="2" type="sldImg"/>
@@ -948,7 +950,205 @@
       </p:sp>
       <p:sp>
         <p:nvSpPr>
-          <p:cNvPr id="142" name="Google Shape;142;g20dafdbd006_0_65:notes"/>
+          <p:cNvPr id="144" name="Google Shape;144;g20dafdbd006_0_44:notes"/>
+          <p:cNvSpPr txBox="1"/>
+          <p:nvPr>
+            <p:ph idx="1" type="body"/>
+          </p:nvPr>
+        </p:nvSpPr>
+        <p:spPr>
+          <a:xfrm>
+            <a:off x="685800" y="4343400"/>
+            <a:ext cx="5486400" cy="4114800"/>
+          </a:xfrm>
+          <a:prstGeom prst="rect">
+            <a:avLst/>
+          </a:prstGeom>
+        </p:spPr>
+        <p:txBody>
+          <a:bodyPr anchorCtr="0" anchor="t" bIns="91425" lIns="91425" spcFirstLastPara="1" rIns="91425" wrap="square" tIns="91425">
+            <a:noAutofit/>
+          </a:bodyPr>
+          <a:lstStyle/>
+          <a:p>
+            <a:pPr indent="0" lvl="0" marL="0" rtl="0" algn="l">
+              <a:spcBef>
+                <a:spcPts val="0"/>
+              </a:spcBef>
+              <a:spcAft>
+                <a:spcPts val="0"/>
+              </a:spcAft>
+              <a:buNone/>
+            </a:pPr>
+            <a:r>
+              <a:t/>
+            </a:r>
+            <a:endParaRPr/>
+          </a:p>
+        </p:txBody>
+      </p:sp>
+    </p:spTree>
+  </p:cSld>
+  <p:clrMapOvr>
+    <a:masterClrMapping/>
+  </p:clrMapOvr>
+</p:notes>
+</file>
+
+<file path=ppt/notesSlides/notesSlide12.xml><?xml version="1.0" encoding="utf-8"?>
+<p:notes xmlns:a="http://schemas.openxmlformats.org/drawingml/2006/main" xmlns:r="http://schemas.openxmlformats.org/officeDocument/2006/relationships" xmlns:mc="http://schemas.openxmlformats.org/markup-compatibility/2006" xmlns:mv="urn:schemas-microsoft-com:mac:vml" xmlns:p="http://schemas.openxmlformats.org/presentationml/2006/main" xmlns:c="http://schemas.openxmlformats.org/drawingml/2006/chart" xmlns:dgm="http://schemas.openxmlformats.org/drawingml/2006/diagram" xmlns:o="urn:schemas-microsoft-com:office:office" xmlns:v="urn:schemas-microsoft-com:vml" xmlns:pvml="urn:schemas-microsoft-com:office:powerpoint" xmlns:com="http://schemas.openxmlformats.org/drawingml/2006/compatibility" xmlns:p14="http://schemas.microsoft.com/office/powerpoint/2010/main" xmlns:p15="http://schemas.microsoft.com/office/powerpoint/2012/main" xmlns:ahyp="http://schemas.microsoft.com/office/drawing/2018/hyperlinkcolor" showMasterPhAnim="0" showMasterSp="0">
+  <p:cSld>
+    <p:spTree>
+      <p:nvGrpSpPr>
+        <p:cNvPr id="147" name="Shape 147"/>
+        <p:cNvGrpSpPr/>
+        <p:nvPr/>
+      </p:nvGrpSpPr>
+      <p:grpSpPr>
+        <a:xfrm>
+          <a:off x="0" y="0"/>
+          <a:ext cx="0" cy="0"/>
+          <a:chOff x="0" y="0"/>
+          <a:chExt cx="0" cy="0"/>
+        </a:xfrm>
+      </p:grpSpPr>
+      <p:sp>
+        <p:nvSpPr>
+          <p:cNvPr id="148" name="Google Shape;148;g20dafdbd006_0_65:notes"/>
+          <p:cNvSpPr/>
+          <p:nvPr>
+            <p:ph idx="2" type="sldImg"/>
+          </p:nvPr>
+        </p:nvSpPr>
+        <p:spPr>
+          <a:xfrm>
+            <a:off x="381300" y="685800"/>
+            <a:ext cx="6096000" cy="3429000"/>
+          </a:xfrm>
+          <a:custGeom>
+            <a:rect b="b" l="l" r="r" t="t"/>
+            <a:pathLst>
+              <a:path extrusionOk="0" h="120000" w="120000">
+                <a:moveTo>
+                  <a:pt x="0" y="0"/>
+                </a:moveTo>
+                <a:lnTo>
+                  <a:pt x="120000" y="0"/>
+                </a:lnTo>
+                <a:lnTo>
+                  <a:pt x="120000" y="120000"/>
+                </a:lnTo>
+                <a:lnTo>
+                  <a:pt x="0" y="120000"/>
+                </a:lnTo>
+                <a:close/>
+              </a:path>
+            </a:pathLst>
+          </a:custGeom>
+        </p:spPr>
+      </p:sp>
+      <p:sp>
+        <p:nvSpPr>
+          <p:cNvPr id="149" name="Google Shape;149;g20dafdbd006_0_65:notes"/>
+          <p:cNvSpPr txBox="1"/>
+          <p:nvPr>
+            <p:ph idx="1" type="body"/>
+          </p:nvPr>
+        </p:nvSpPr>
+        <p:spPr>
+          <a:xfrm>
+            <a:off x="685800" y="4343400"/>
+            <a:ext cx="5486400" cy="4114800"/>
+          </a:xfrm>
+          <a:prstGeom prst="rect">
+            <a:avLst/>
+          </a:prstGeom>
+        </p:spPr>
+        <p:txBody>
+          <a:bodyPr anchorCtr="0" anchor="t" bIns="91425" lIns="91425" spcFirstLastPara="1" rIns="91425" wrap="square" tIns="91425">
+            <a:noAutofit/>
+          </a:bodyPr>
+          <a:lstStyle/>
+          <a:p>
+            <a:pPr indent="0" lvl="0" marL="0" rtl="0" algn="l">
+              <a:spcBef>
+                <a:spcPts val="0"/>
+              </a:spcBef>
+              <a:spcAft>
+                <a:spcPts val="0"/>
+              </a:spcAft>
+              <a:buNone/>
+            </a:pPr>
+            <a:r>
+              <a:t/>
+            </a:r>
+            <a:endParaRPr/>
+          </a:p>
+        </p:txBody>
+      </p:sp>
+    </p:spTree>
+  </p:cSld>
+  <p:clrMapOvr>
+    <a:masterClrMapping/>
+  </p:clrMapOvr>
+</p:notes>
+</file>
+
+<file path=ppt/notesSlides/notesSlide13.xml><?xml version="1.0" encoding="utf-8"?>
+<p:notes xmlns:a="http://schemas.openxmlformats.org/drawingml/2006/main" xmlns:r="http://schemas.openxmlformats.org/officeDocument/2006/relationships" xmlns:mc="http://schemas.openxmlformats.org/markup-compatibility/2006" xmlns:mv="urn:schemas-microsoft-com:mac:vml" xmlns:p="http://schemas.openxmlformats.org/presentationml/2006/main" xmlns:c="http://schemas.openxmlformats.org/drawingml/2006/chart" xmlns:dgm="http://schemas.openxmlformats.org/drawingml/2006/diagram" xmlns:o="urn:schemas-microsoft-com:office:office" xmlns:v="urn:schemas-microsoft-com:vml" xmlns:pvml="urn:schemas-microsoft-com:office:powerpoint" xmlns:com="http://schemas.openxmlformats.org/drawingml/2006/compatibility" xmlns:p14="http://schemas.microsoft.com/office/powerpoint/2010/main" xmlns:p15="http://schemas.microsoft.com/office/powerpoint/2012/main" xmlns:ahyp="http://schemas.microsoft.com/office/drawing/2018/hyperlinkcolor" showMasterPhAnim="0" showMasterSp="0">
+  <p:cSld>
+    <p:spTree>
+      <p:nvGrpSpPr>
+        <p:cNvPr id="153" name="Shape 153"/>
+        <p:cNvGrpSpPr/>
+        <p:nvPr/>
+      </p:nvGrpSpPr>
+      <p:grpSpPr>
+        <a:xfrm>
+          <a:off x="0" y="0"/>
+          <a:ext cx="0" cy="0"/>
+          <a:chOff x="0" y="0"/>
+          <a:chExt cx="0" cy="0"/>
+        </a:xfrm>
+      </p:grpSpPr>
+      <p:sp>
+        <p:nvSpPr>
+          <p:cNvPr id="154" name="Google Shape;154;g2e0e7074926_0_1:notes"/>
+          <p:cNvSpPr/>
+          <p:nvPr>
+            <p:ph idx="2" type="sldImg"/>
+          </p:nvPr>
+        </p:nvSpPr>
+        <p:spPr>
+          <a:xfrm>
+            <a:off x="381300" y="685800"/>
+            <a:ext cx="6096000" cy="3429000"/>
+          </a:xfrm>
+          <a:custGeom>
+            <a:rect b="b" l="l" r="r" t="t"/>
+            <a:pathLst>
+              <a:path extrusionOk="0" h="120000" w="120000">
+                <a:moveTo>
+                  <a:pt x="0" y="0"/>
+                </a:moveTo>
+                <a:lnTo>
+                  <a:pt x="120000" y="0"/>
+                </a:lnTo>
+                <a:lnTo>
+                  <a:pt x="120000" y="120000"/>
+                </a:lnTo>
+                <a:lnTo>
+                  <a:pt x="0" y="120000"/>
+                </a:lnTo>
+                <a:close/>
+              </a:path>
+            </a:pathLst>
+          </a:custGeom>
+        </p:spPr>
+      </p:sp>
+      <p:sp>
+        <p:nvSpPr>
+          <p:cNvPr id="155" name="Google Shape;155;g2e0e7074926_0_1:notes"/>
           <p:cNvSpPr txBox="1"/>
           <p:nvPr>
             <p:ph idx="1" type="body"/>
@@ -1210,7 +1410,7 @@
       </p:grpSpPr>
       <p:sp>
         <p:nvSpPr>
-          <p:cNvPr id="79" name="Google Shape;79;g20dafdbd006_0_11:notes"/>
+          <p:cNvPr id="79" name="Google Shape;79;g2e0f63cd8bd_1_0:notes"/>
           <p:cNvSpPr/>
           <p:nvPr>
             <p:ph idx="2" type="sldImg"/>
@@ -1245,7 +1445,7 @@
       </p:sp>
       <p:sp>
         <p:nvSpPr>
-          <p:cNvPr id="80" name="Google Shape;80;g20dafdbd006_0_11:notes"/>
+          <p:cNvPr id="80" name="Google Shape;80;g2e0f63cd8bd_1_0:notes"/>
           <p:cNvSpPr txBox="1"/>
           <p:nvPr>
             <p:ph idx="1" type="body"/>
@@ -1295,7 +1495,7 @@
   <p:cSld>
     <p:spTree>
       <p:nvGrpSpPr>
-        <p:cNvPr id="88" name="Shape 88"/>
+        <p:cNvPr id="85" name="Shape 85"/>
         <p:cNvGrpSpPr/>
         <p:nvPr/>
       </p:nvGrpSpPr>
@@ -1309,7 +1509,7 @@
       </p:grpSpPr>
       <p:sp>
         <p:nvSpPr>
-          <p:cNvPr id="89" name="Google Shape;89;g20dafdbd006_0_132:notes"/>
+          <p:cNvPr id="86" name="Google Shape;86;g20dafdbd006_0_11:notes"/>
           <p:cNvSpPr/>
           <p:nvPr>
             <p:ph idx="2" type="sldImg"/>
@@ -1344,7 +1544,7 @@
       </p:sp>
       <p:sp>
         <p:nvSpPr>
-          <p:cNvPr id="90" name="Google Shape;90;g20dafdbd006_0_132:notes"/>
+          <p:cNvPr id="87" name="Google Shape;87;g20dafdbd006_0_11:notes"/>
           <p:cNvSpPr txBox="1"/>
           <p:nvPr>
             <p:ph idx="1" type="body"/>
@@ -1394,7 +1594,7 @@
   <p:cSld>
     <p:spTree>
       <p:nvGrpSpPr>
-        <p:cNvPr id="98" name="Shape 98"/>
+        <p:cNvPr id="95" name="Shape 95"/>
         <p:cNvGrpSpPr/>
         <p:nvPr/>
       </p:nvGrpSpPr>
@@ -1408,7 +1608,7 @@
       </p:grpSpPr>
       <p:sp>
         <p:nvSpPr>
-          <p:cNvPr id="99" name="Google Shape;99;g20dafdbd006_0_17:notes"/>
+          <p:cNvPr id="96" name="Google Shape;96;g20dafdbd006_0_132:notes"/>
           <p:cNvSpPr/>
           <p:nvPr>
             <p:ph idx="2" type="sldImg"/>
@@ -1443,7 +1643,7 @@
       </p:sp>
       <p:sp>
         <p:nvSpPr>
-          <p:cNvPr id="100" name="Google Shape;100;g20dafdbd006_0_17:notes"/>
+          <p:cNvPr id="97" name="Google Shape;97;g20dafdbd006_0_132:notes"/>
           <p:cNvSpPr txBox="1"/>
           <p:nvPr>
             <p:ph idx="1" type="body"/>
@@ -1493,7 +1693,7 @@
   <p:cSld>
     <p:spTree>
       <p:nvGrpSpPr>
-        <p:cNvPr id="108" name="Shape 108"/>
+        <p:cNvPr id="105" name="Shape 105"/>
         <p:cNvGrpSpPr/>
         <p:nvPr/>
       </p:nvGrpSpPr>
@@ -1507,7 +1707,7 @@
       </p:grpSpPr>
       <p:sp>
         <p:nvSpPr>
-          <p:cNvPr id="109" name="Google Shape;109;g20dafdbd006_0_143:notes"/>
+          <p:cNvPr id="106" name="Google Shape;106;g20dafdbd006_0_17:notes"/>
           <p:cNvSpPr/>
           <p:nvPr>
             <p:ph idx="2" type="sldImg"/>
@@ -1542,7 +1742,7 @@
       </p:sp>
       <p:sp>
         <p:nvSpPr>
-          <p:cNvPr id="110" name="Google Shape;110;g20dafdbd006_0_143:notes"/>
+          <p:cNvPr id="107" name="Google Shape;107;g20dafdbd006_0_17:notes"/>
           <p:cNvSpPr txBox="1"/>
           <p:nvPr>
             <p:ph idx="1" type="body"/>
@@ -1592,7 +1792,7 @@
   <p:cSld>
     <p:spTree>
       <p:nvGrpSpPr>
-        <p:cNvPr id="118" name="Shape 118"/>
+        <p:cNvPr id="115" name="Shape 115"/>
         <p:cNvGrpSpPr/>
         <p:nvPr/>
       </p:nvGrpSpPr>
@@ -1606,7 +1806,7 @@
       </p:grpSpPr>
       <p:sp>
         <p:nvSpPr>
-          <p:cNvPr id="119" name="Google Shape;119;g20dafdbd006_0_5:notes"/>
+          <p:cNvPr id="116" name="Google Shape;116;g20dafdbd006_0_143:notes"/>
           <p:cNvSpPr/>
           <p:nvPr>
             <p:ph idx="2" type="sldImg"/>
@@ -1641,7 +1841,7 @@
       </p:sp>
       <p:sp>
         <p:nvSpPr>
-          <p:cNvPr id="120" name="Google Shape;120;g20dafdbd006_0_5:notes"/>
+          <p:cNvPr id="117" name="Google Shape;117;g20dafdbd006_0_143:notes"/>
           <p:cNvSpPr txBox="1"/>
           <p:nvPr>
             <p:ph idx="1" type="body"/>
@@ -1691,7 +1891,7 @@
   <p:cSld>
     <p:spTree>
       <p:nvGrpSpPr>
-        <p:cNvPr id="128" name="Shape 128"/>
+        <p:cNvPr id="125" name="Shape 125"/>
         <p:cNvGrpSpPr/>
         <p:nvPr/>
       </p:nvGrpSpPr>
@@ -1705,7 +1905,7 @@
       </p:grpSpPr>
       <p:sp>
         <p:nvSpPr>
-          <p:cNvPr id="129" name="Google Shape;129;g20dafdbd006_0_119:notes"/>
+          <p:cNvPr id="126" name="Google Shape;126;g20dafdbd006_0_5:notes"/>
           <p:cNvSpPr/>
           <p:nvPr>
             <p:ph idx="2" type="sldImg"/>
@@ -1740,7 +1940,7 @@
       </p:sp>
       <p:sp>
         <p:nvSpPr>
-          <p:cNvPr id="130" name="Google Shape;130;g20dafdbd006_0_119:notes"/>
+          <p:cNvPr id="127" name="Google Shape;127;g20dafdbd006_0_5:notes"/>
           <p:cNvSpPr txBox="1"/>
           <p:nvPr>
             <p:ph idx="1" type="body"/>
@@ -6621,6 +6821,395 @@
           <p:cNvPr id="139" name="Google Shape;139;p22"/>
           <p:cNvSpPr txBox="1"/>
           <p:nvPr>
+            <p:ph type="title"/>
+          </p:nvPr>
+        </p:nvSpPr>
+        <p:spPr>
+          <a:xfrm>
+            <a:off x="364975" y="69500"/>
+            <a:ext cx="8428200" cy="572700"/>
+          </a:xfrm>
+          <a:prstGeom prst="rect">
+            <a:avLst/>
+          </a:prstGeom>
+        </p:spPr>
+        <p:txBody>
+          <a:bodyPr anchorCtr="0" anchor="t" bIns="91425" lIns="91425" spcFirstLastPara="1" rIns="91425" wrap="square" tIns="91425">
+            <a:noAutofit/>
+          </a:bodyPr>
+          <a:lstStyle/>
+          <a:p>
+            <a:pPr indent="0" lvl="0" marL="0" rtl="0" algn="ctr">
+              <a:spcBef>
+                <a:spcPts val="0"/>
+              </a:spcBef>
+              <a:spcAft>
+                <a:spcPts val="0"/>
+              </a:spcAft>
+              <a:buNone/>
+            </a:pPr>
+            <a:r>
+              <a:rPr lang="pt-BR" sz="4000">
+                <a:solidFill>
+                  <a:srgbClr val="BF9000"/>
+                </a:solidFill>
+              </a:rPr>
+              <a:t>Final Considerations</a:t>
+            </a:r>
+            <a:endParaRPr sz="4000">
+              <a:solidFill>
+                <a:srgbClr val="BF9000"/>
+              </a:solidFill>
+            </a:endParaRPr>
+          </a:p>
+        </p:txBody>
+      </p:sp>
+      <p:sp>
+        <p:nvSpPr>
+          <p:cNvPr id="140" name="Google Shape;140;p22"/>
+          <p:cNvSpPr txBox="1"/>
+          <p:nvPr>
+            <p:ph idx="1" type="body"/>
+          </p:nvPr>
+        </p:nvSpPr>
+        <p:spPr>
+          <a:xfrm>
+            <a:off x="2803525" y="970400"/>
+            <a:ext cx="6086100" cy="3858000"/>
+          </a:xfrm>
+          <a:prstGeom prst="rect">
+            <a:avLst/>
+          </a:prstGeom>
+        </p:spPr>
+        <p:txBody>
+          <a:bodyPr anchorCtr="0" anchor="t" bIns="91425" lIns="91425" spcFirstLastPara="1" rIns="91425" wrap="square" tIns="91425">
+            <a:normAutofit fontScale="25000" lnSpcReduction="20000"/>
+          </a:bodyPr>
+          <a:lstStyle/>
+          <a:p>
+            <a:pPr indent="0" lvl="0" marL="0" rtl="0" algn="just">
+              <a:lnSpc>
+                <a:spcPct val="100000"/>
+              </a:lnSpc>
+              <a:spcBef>
+                <a:spcPts val="0"/>
+              </a:spcBef>
+              <a:spcAft>
+                <a:spcPts val="0"/>
+              </a:spcAft>
+              <a:buNone/>
+            </a:pPr>
+            <a:r>
+              <a:rPr lang="pt-BR" sz="6550">
+                <a:solidFill>
+                  <a:srgbClr val="BF9000"/>
+                </a:solidFill>
+              </a:rPr>
+              <a:t>The machine learning model demonstrates strong performance in predicting breast cancer-related genes/proteins. The overall accuracy of the model is 95%, indicating that the model correctly predicts the gene/protein in 95% of the cases.</a:t>
+            </a:r>
+            <a:br>
+              <a:rPr lang="pt-BR" sz="6550">
+                <a:solidFill>
+                  <a:srgbClr val="BF9000"/>
+                </a:solidFill>
+              </a:rPr>
+            </a:br>
+            <a:endParaRPr sz="6550">
+              <a:solidFill>
+                <a:srgbClr val="BF9000"/>
+              </a:solidFill>
+            </a:endParaRPr>
+          </a:p>
+          <a:p>
+            <a:pPr indent="-332581" lvl="0" marL="457200" rtl="0" algn="just">
+              <a:lnSpc>
+                <a:spcPct val="100000"/>
+              </a:lnSpc>
+              <a:spcBef>
+                <a:spcPts val="0"/>
+              </a:spcBef>
+              <a:spcAft>
+                <a:spcPts val="0"/>
+              </a:spcAft>
+              <a:buClr>
+                <a:srgbClr val="BF9000"/>
+              </a:buClr>
+              <a:buSzPct val="100000"/>
+              <a:buChar char="●"/>
+            </a:pPr>
+            <a:r>
+              <a:rPr lang="pt-BR" sz="6550">
+                <a:solidFill>
+                  <a:srgbClr val="BF9000"/>
+                </a:solidFill>
+              </a:rPr>
+              <a:t>Classes 4 and 5 represent genes whose mutations are not very impactful. This likely means that the characteristics of these mutations are more homogeneous and less complex, making it easier for the model to classify them correctly. As a result, the model exhibits high precision, recall, and F1-score for these classes, demonstrating its efficiency in handling less impactful mutations.</a:t>
+            </a:r>
+            <a:endParaRPr sz="6550">
+              <a:solidFill>
+                <a:srgbClr val="BF9000"/>
+              </a:solidFill>
+            </a:endParaRPr>
+          </a:p>
+          <a:p>
+            <a:pPr indent="0" lvl="0" marL="0" rtl="0" algn="just">
+              <a:lnSpc>
+                <a:spcPct val="100000"/>
+              </a:lnSpc>
+              <a:spcBef>
+                <a:spcPts val="0"/>
+              </a:spcBef>
+              <a:spcAft>
+                <a:spcPts val="0"/>
+              </a:spcAft>
+              <a:buNone/>
+            </a:pPr>
+            <a:r>
+              <a:t/>
+            </a:r>
+            <a:endParaRPr sz="5600">
+              <a:solidFill>
+                <a:srgbClr val="BF9000"/>
+              </a:solidFill>
+            </a:endParaRPr>
+          </a:p>
+          <a:p>
+            <a:pPr indent="0" lvl="0" marL="0" rtl="0" algn="l">
+              <a:lnSpc>
+                <a:spcPct val="100000"/>
+              </a:lnSpc>
+              <a:spcBef>
+                <a:spcPts val="0"/>
+              </a:spcBef>
+              <a:spcAft>
+                <a:spcPts val="0"/>
+              </a:spcAft>
+              <a:buNone/>
+            </a:pPr>
+            <a:r>
+              <a:t/>
+            </a:r>
+            <a:endParaRPr sz="5600">
+              <a:solidFill>
+                <a:srgbClr val="BF9000"/>
+              </a:solidFill>
+            </a:endParaRPr>
+          </a:p>
+          <a:p>
+            <a:pPr indent="0" lvl="0" marL="0" rtl="0" algn="l">
+              <a:lnSpc>
+                <a:spcPct val="100000"/>
+              </a:lnSpc>
+              <a:spcBef>
+                <a:spcPts val="0"/>
+              </a:spcBef>
+              <a:spcAft>
+                <a:spcPts val="0"/>
+              </a:spcAft>
+              <a:buNone/>
+            </a:pPr>
+            <a:r>
+              <a:t/>
+            </a:r>
+            <a:endParaRPr sz="5600">
+              <a:solidFill>
+                <a:srgbClr val="BF9000"/>
+              </a:solidFill>
+            </a:endParaRPr>
+          </a:p>
+          <a:p>
+            <a:pPr indent="0" lvl="0" marL="0" rtl="0" algn="l">
+              <a:lnSpc>
+                <a:spcPct val="100000"/>
+              </a:lnSpc>
+              <a:spcBef>
+                <a:spcPts val="0"/>
+              </a:spcBef>
+              <a:spcAft>
+                <a:spcPts val="0"/>
+              </a:spcAft>
+              <a:buNone/>
+            </a:pPr>
+            <a:r>
+              <a:t/>
+            </a:r>
+            <a:endParaRPr sz="5600">
+              <a:solidFill>
+                <a:srgbClr val="BF9000"/>
+              </a:solidFill>
+            </a:endParaRPr>
+          </a:p>
+          <a:p>
+            <a:pPr indent="0" lvl="0" marL="0" rtl="0" algn="l">
+              <a:lnSpc>
+                <a:spcPct val="100000"/>
+              </a:lnSpc>
+              <a:spcBef>
+                <a:spcPts val="0"/>
+              </a:spcBef>
+              <a:spcAft>
+                <a:spcPts val="0"/>
+              </a:spcAft>
+              <a:buNone/>
+            </a:pPr>
+            <a:r>
+              <a:rPr lang="pt-BR" sz="5600">
+                <a:solidFill>
+                  <a:srgbClr val="BF9000"/>
+                </a:solidFill>
+              </a:rPr>
+              <a:t>Benchmark: over 90%</a:t>
+            </a:r>
+            <a:endParaRPr sz="5600">
+              <a:solidFill>
+                <a:srgbClr val="BF9000"/>
+              </a:solidFill>
+            </a:endParaRPr>
+          </a:p>
+          <a:p>
+            <a:pPr indent="0" lvl="0" marL="0" rtl="0" algn="l">
+              <a:lnSpc>
+                <a:spcPct val="100000"/>
+              </a:lnSpc>
+              <a:spcBef>
+                <a:spcPts val="0"/>
+              </a:spcBef>
+              <a:spcAft>
+                <a:spcPts val="0"/>
+              </a:spcAft>
+              <a:buNone/>
+            </a:pPr>
+            <a:r>
+              <a:rPr lang="pt-BR" sz="5600">
+                <a:solidFill>
+                  <a:srgbClr val="BF9000"/>
+                </a:solidFill>
+              </a:rPr>
+              <a:t>source: </a:t>
+            </a:r>
+            <a:r>
+              <a:rPr i="1" lang="pt-BR" sz="5600">
+                <a:solidFill>
+                  <a:srgbClr val="BF9000"/>
+                </a:solidFill>
+              </a:rPr>
+              <a:t>Benchmarking 50 classification algorithms on 50 gene-expression datasets</a:t>
+            </a:r>
+            <a:endParaRPr i="1" sz="5600">
+              <a:solidFill>
+                <a:srgbClr val="BF9000"/>
+              </a:solidFill>
+            </a:endParaRPr>
+          </a:p>
+          <a:p>
+            <a:pPr indent="0" lvl="0" marL="0" rtl="0" algn="l">
+              <a:lnSpc>
+                <a:spcPct val="100000"/>
+              </a:lnSpc>
+              <a:spcBef>
+                <a:spcPts val="0"/>
+              </a:spcBef>
+              <a:spcAft>
+                <a:spcPts val="0"/>
+              </a:spcAft>
+              <a:buNone/>
+            </a:pPr>
+            <a:r>
+              <a:rPr lang="pt-BR" sz="2523">
+                <a:solidFill>
+                  <a:srgbClr val="BF9000"/>
+                </a:solidFill>
+              </a:rPr>
+              <a:t>https://www.biorxiv.org/content/10.1101/2021.05.07.442940v1.full</a:t>
+            </a:r>
+            <a:endParaRPr sz="2523">
+              <a:solidFill>
+                <a:srgbClr val="BF9000"/>
+              </a:solidFill>
+            </a:endParaRPr>
+          </a:p>
+          <a:p>
+            <a:pPr indent="0" lvl="0" marL="0" rtl="0" algn="l">
+              <a:lnSpc>
+                <a:spcPct val="100000"/>
+              </a:lnSpc>
+              <a:spcBef>
+                <a:spcPts val="0"/>
+              </a:spcBef>
+              <a:spcAft>
+                <a:spcPts val="0"/>
+              </a:spcAft>
+              <a:buNone/>
+            </a:pPr>
+            <a:r>
+              <a:t/>
+            </a:r>
+            <a:endParaRPr sz="5600">
+              <a:solidFill>
+                <a:srgbClr val="BF9000"/>
+              </a:solidFill>
+            </a:endParaRPr>
+          </a:p>
+        </p:txBody>
+      </p:sp>
+      <p:pic>
+        <p:nvPicPr>
+          <p:cNvPr id="141" name="Google Shape;141;p22"/>
+          <p:cNvPicPr preferRelativeResize="0"/>
+          <p:nvPr/>
+        </p:nvPicPr>
+        <p:blipFill>
+          <a:blip r:embed="rId3">
+            <a:alphaModFix/>
+          </a:blip>
+          <a:stretch>
+            <a:fillRect/>
+          </a:stretch>
+        </p:blipFill>
+        <p:spPr>
+          <a:xfrm>
+            <a:off x="207625" y="1021913"/>
+            <a:ext cx="2498726" cy="3099685"/>
+          </a:xfrm>
+          <a:prstGeom prst="rect">
+            <a:avLst/>
+          </a:prstGeom>
+          <a:noFill/>
+          <a:ln>
+            <a:noFill/>
+          </a:ln>
+        </p:spPr>
+      </p:pic>
+    </p:spTree>
+  </p:cSld>
+  <p:clrMapOvr>
+    <a:masterClrMapping/>
+  </p:clrMapOvr>
+</p:sld>
+</file>
+
+<file path=ppt/slides/slide11.xml><?xml version="1.0" encoding="utf-8"?>
+<p:sld xmlns:a="http://schemas.openxmlformats.org/drawingml/2006/main" xmlns:r="http://schemas.openxmlformats.org/officeDocument/2006/relationships" xmlns:mc="http://schemas.openxmlformats.org/markup-compatibility/2006" xmlns:mv="urn:schemas-microsoft-com:mac:vml" xmlns:p="http://schemas.openxmlformats.org/presentationml/2006/main" xmlns:c="http://schemas.openxmlformats.org/drawingml/2006/chart" xmlns:dgm="http://schemas.openxmlformats.org/drawingml/2006/diagram" xmlns:o="urn:schemas-microsoft-com:office:office" xmlns:v="urn:schemas-microsoft-com:vml" xmlns:pvml="urn:schemas-microsoft-com:office:powerpoint" xmlns:com="http://schemas.openxmlformats.org/drawingml/2006/compatibility" xmlns:p14="http://schemas.microsoft.com/office/powerpoint/2010/main" xmlns:p15="http://schemas.microsoft.com/office/powerpoint/2012/main" xmlns:ahyp="http://schemas.microsoft.com/office/drawing/2018/hyperlinkcolor">
+  <p:cSld>
+    <p:spTree>
+      <p:nvGrpSpPr>
+        <p:cNvPr id="145" name="Shape 145"/>
+        <p:cNvGrpSpPr/>
+        <p:nvPr/>
+      </p:nvGrpSpPr>
+      <p:grpSpPr>
+        <a:xfrm>
+          <a:off x="0" y="0"/>
+          <a:ext cx="0" cy="0"/>
+          <a:chOff x="0" y="0"/>
+          <a:chExt cx="0" cy="0"/>
+        </a:xfrm>
+      </p:grpSpPr>
+      <p:sp>
+        <p:nvSpPr>
+          <p:cNvPr id="146" name="Google Shape;146;p23"/>
+          <p:cNvSpPr txBox="1"/>
+          <p:nvPr>
             <p:ph idx="1" type="subTitle"/>
           </p:nvPr>
         </p:nvSpPr>
@@ -6714,12 +7303,12 @@
 </p:sld>
 </file>
 
-<file path=ppt/slides/slide11.xml><?xml version="1.0" encoding="utf-8"?>
+<file path=ppt/slides/slide12.xml><?xml version="1.0" encoding="utf-8"?>
 <p:sld xmlns:a="http://schemas.openxmlformats.org/drawingml/2006/main" xmlns:r="http://schemas.openxmlformats.org/officeDocument/2006/relationships" xmlns:mc="http://schemas.openxmlformats.org/markup-compatibility/2006" xmlns:mv="urn:schemas-microsoft-com:mac:vml" xmlns:p="http://schemas.openxmlformats.org/presentationml/2006/main" xmlns:c="http://schemas.openxmlformats.org/drawingml/2006/chart" xmlns:dgm="http://schemas.openxmlformats.org/drawingml/2006/diagram" xmlns:o="urn:schemas-microsoft-com:office:office" xmlns:v="urn:schemas-microsoft-com:vml" xmlns:pvml="urn:schemas-microsoft-com:office:powerpoint" xmlns:com="http://schemas.openxmlformats.org/drawingml/2006/compatibility" xmlns:p14="http://schemas.microsoft.com/office/powerpoint/2010/main" xmlns:p15="http://schemas.microsoft.com/office/powerpoint/2012/main" xmlns:ahyp="http://schemas.microsoft.com/office/drawing/2018/hyperlinkcolor">
   <p:cSld>
     <p:spTree>
       <p:nvGrpSpPr>
-        <p:cNvPr id="143" name="Shape 143"/>
+        <p:cNvPr id="150" name="Shape 150"/>
         <p:cNvGrpSpPr/>
         <p:nvPr/>
       </p:nvGrpSpPr>
@@ -6733,7 +7322,7 @@
       </p:grpSpPr>
       <p:sp>
         <p:nvSpPr>
-          <p:cNvPr id="144" name="Google Shape;144;p23"/>
+          <p:cNvPr id="151" name="Google Shape;151;p24"/>
           <p:cNvSpPr txBox="1"/>
           <p:nvPr>
             <p:ph type="title"/>
@@ -6781,7 +7370,7 @@
       </p:sp>
       <p:sp>
         <p:nvSpPr>
-          <p:cNvPr id="145" name="Google Shape;145;p23"/>
+          <p:cNvPr id="152" name="Google Shape;152;p24"/>
           <p:cNvSpPr txBox="1"/>
           <p:nvPr>
             <p:ph idx="1" type="body"/>
@@ -6798,11 +7387,14 @@
         </p:spPr>
         <p:txBody>
           <a:bodyPr anchorCtr="0" anchor="t" bIns="91425" lIns="91425" spcFirstLastPara="1" rIns="91425" wrap="square" tIns="91425">
-            <a:normAutofit/>
+            <a:normAutofit lnSpcReduction="20000"/>
           </a:bodyPr>
           <a:lstStyle/>
           <a:p>
-            <a:pPr indent="0" lvl="0" marL="0" rtl="0" algn="l">
+            <a:pPr indent="0" lvl="0" marL="0" marR="0" rtl="0" algn="l">
+              <a:lnSpc>
+                <a:spcPct val="115000"/>
+              </a:lnSpc>
               <a:spcBef>
                 <a:spcPts val="0"/>
               </a:spcBef>
@@ -6826,14 +7418,17 @@
               </a:rPr>
               <a:t>https://maayanlab.cloud/Harmonizome/</a:t>
             </a:r>
-            <a:endParaRPr sz="1500">
+            <a:endParaRPr sz="1500" u="sng">
               <a:solidFill>
                 <a:srgbClr val="BF9000"/>
               </a:solidFill>
             </a:endParaRPr>
           </a:p>
           <a:p>
-            <a:pPr indent="0" lvl="0" marL="0" rtl="0" algn="l">
+            <a:pPr indent="0" lvl="0" marL="0" marR="0" rtl="0" algn="l">
+              <a:lnSpc>
+                <a:spcPct val="115000"/>
+              </a:lnSpc>
               <a:spcBef>
                 <a:spcPts val="1200"/>
               </a:spcBef>
@@ -6857,14 +7452,17 @@
               </a:rPr>
               <a:t>https://www.disgenet.org</a:t>
             </a:r>
-            <a:endParaRPr sz="1500">
+            <a:endParaRPr sz="1500" u="sng">
               <a:solidFill>
                 <a:srgbClr val="BF9000"/>
               </a:solidFill>
             </a:endParaRPr>
           </a:p>
           <a:p>
-            <a:pPr indent="0" lvl="0" marL="0" rtl="0" algn="l">
+            <a:pPr indent="0" lvl="0" marL="0" marR="0" rtl="0" algn="l">
+              <a:lnSpc>
+                <a:spcPct val="115000"/>
+              </a:lnSpc>
               <a:spcBef>
                 <a:spcPts val="1200"/>
               </a:spcBef>
@@ -6888,14 +7486,17 @@
               </a:rPr>
               <a:t>https://www.cancer.gov</a:t>
             </a:r>
-            <a:endParaRPr sz="1500">
+            <a:endParaRPr sz="1500" u="sng">
               <a:solidFill>
                 <a:srgbClr val="BF9000"/>
               </a:solidFill>
             </a:endParaRPr>
           </a:p>
           <a:p>
-            <a:pPr indent="0" lvl="0" marL="0" rtl="0" algn="l">
+            <a:pPr indent="0" lvl="0" marL="0" marR="0" rtl="0" algn="l">
+              <a:lnSpc>
+                <a:spcPct val="115000"/>
+              </a:lnSpc>
               <a:spcBef>
                 <a:spcPts val="1200"/>
               </a:spcBef>
@@ -6919,14 +7520,17 @@
               </a:rPr>
               <a:t>https://www.cancerresearchuk.org</a:t>
             </a:r>
-            <a:endParaRPr sz="1500">
+            <a:endParaRPr sz="1500" u="sng">
               <a:solidFill>
                 <a:srgbClr val="BF9000"/>
               </a:solidFill>
             </a:endParaRPr>
           </a:p>
           <a:p>
-            <a:pPr indent="0" lvl="0" marL="0" rtl="0" algn="l">
+            <a:pPr indent="0" lvl="0" marL="0" marR="0" rtl="0" algn="l">
+              <a:lnSpc>
+                <a:spcPct val="115000"/>
+              </a:lnSpc>
               <a:spcBef>
                 <a:spcPts val="1200"/>
               </a:spcBef>
@@ -6950,14 +7554,17 @@
               </a:rPr>
               <a:t>https://www.medicalnewstoday.com</a:t>
             </a:r>
-            <a:endParaRPr sz="1500">
+            <a:endParaRPr sz="1500" u="sng">
               <a:solidFill>
                 <a:srgbClr val="BF9000"/>
               </a:solidFill>
             </a:endParaRPr>
           </a:p>
           <a:p>
-            <a:pPr indent="0" lvl="0" marL="0" rtl="0" algn="l">
+            <a:pPr indent="0" lvl="0" marL="0" marR="0" rtl="0" algn="l">
+              <a:lnSpc>
+                <a:spcPct val="115000"/>
+              </a:lnSpc>
               <a:spcBef>
                 <a:spcPts val="1200"/>
               </a:spcBef>
@@ -6981,16 +7588,16 @@
               </a:rPr>
               <a:t>https://www.facingourrisk.org</a:t>
             </a:r>
-            <a:endParaRPr sz="1500">
+            <a:endParaRPr sz="1500" u="sng">
               <a:solidFill>
                 <a:srgbClr val="BF9000"/>
               </a:solidFill>
             </a:endParaRPr>
           </a:p>
           <a:p>
-            <a:pPr indent="0" lvl="0" marL="0" rtl="0" algn="l">
+            <a:pPr indent="0" lvl="0" marL="0" marR="0" rtl="0" algn="l">
               <a:lnSpc>
-                <a:spcPct val="100000"/>
+                <a:spcPct val="115000"/>
               </a:lnSpc>
               <a:spcBef>
                 <a:spcPts val="1200"/>
@@ -7015,7 +7622,157 @@
               </a:rPr>
               <a:t>https://www.biorxiv.org</a:t>
             </a:r>
+            <a:endParaRPr sz="1500" u="sng">
+              <a:solidFill>
+                <a:srgbClr val="BF9000"/>
+              </a:solidFill>
+            </a:endParaRPr>
+          </a:p>
+          <a:p>
+            <a:pPr indent="0" lvl="0" marL="0" marR="0" rtl="0" algn="l">
+              <a:lnSpc>
+                <a:spcPct val="115000"/>
+              </a:lnSpc>
+              <a:spcBef>
+                <a:spcPts val="1200"/>
+              </a:spcBef>
+              <a:spcAft>
+                <a:spcPts val="1200"/>
+              </a:spcAft>
+              <a:buNone/>
+            </a:pPr>
+            <a:r>
+              <a:rPr lang="pt-BR" sz="1500" u="sng">
+                <a:solidFill>
+                  <a:srgbClr val="BF9000"/>
+                </a:solidFill>
+                <a:hlinkClick r:id="rId10">
+                  <a:extLst>
+                    <a:ext uri="{A12FA001-AC4F-418D-AE19-62706E023703}">
+                      <ahyp:hlinkClr val="tx"/>
+                    </a:ext>
+                  </a:extLst>
+                </a:hlinkClick>
+              </a:rPr>
+              <a:t>https://thebiogrid.org/</a:t>
+            </a:r>
             <a:endParaRPr sz="2523">
+              <a:solidFill>
+                <a:srgbClr val="BF9000"/>
+              </a:solidFill>
+            </a:endParaRPr>
+          </a:p>
+        </p:txBody>
+      </p:sp>
+    </p:spTree>
+  </p:cSld>
+  <p:clrMapOvr>
+    <a:masterClrMapping/>
+  </p:clrMapOvr>
+</p:sld>
+</file>
+
+<file path=ppt/slides/slide13.xml><?xml version="1.0" encoding="utf-8"?>
+<p:sld xmlns:a="http://schemas.openxmlformats.org/drawingml/2006/main" xmlns:r="http://schemas.openxmlformats.org/officeDocument/2006/relationships" xmlns:mc="http://schemas.openxmlformats.org/markup-compatibility/2006" xmlns:mv="urn:schemas-microsoft-com:mac:vml" xmlns:p="http://schemas.openxmlformats.org/presentationml/2006/main" xmlns:c="http://schemas.openxmlformats.org/drawingml/2006/chart" xmlns:dgm="http://schemas.openxmlformats.org/drawingml/2006/diagram" xmlns:o="urn:schemas-microsoft-com:office:office" xmlns:v="urn:schemas-microsoft-com:vml" xmlns:pvml="urn:schemas-microsoft-com:office:powerpoint" xmlns:com="http://schemas.openxmlformats.org/drawingml/2006/compatibility" xmlns:p14="http://schemas.microsoft.com/office/powerpoint/2010/main" xmlns:p15="http://schemas.microsoft.com/office/powerpoint/2012/main" xmlns:ahyp="http://schemas.microsoft.com/office/drawing/2018/hyperlinkcolor">
+  <p:cSld>
+    <p:spTree>
+      <p:nvGrpSpPr>
+        <p:cNvPr id="156" name="Shape 156"/>
+        <p:cNvGrpSpPr/>
+        <p:nvPr/>
+      </p:nvGrpSpPr>
+      <p:grpSpPr>
+        <a:xfrm>
+          <a:off x="0" y="0"/>
+          <a:ext cx="0" cy="0"/>
+          <a:chOff x="0" y="0"/>
+          <a:chExt cx="0" cy="0"/>
+        </a:xfrm>
+      </p:grpSpPr>
+      <p:sp>
+        <p:nvSpPr>
+          <p:cNvPr id="157" name="Google Shape;157;p25"/>
+          <p:cNvSpPr txBox="1"/>
+          <p:nvPr>
+            <p:ph idx="1" type="body"/>
+          </p:nvPr>
+        </p:nvSpPr>
+        <p:spPr>
+          <a:xfrm>
+            <a:off x="311700" y="1595100"/>
+            <a:ext cx="8520600" cy="2973600"/>
+          </a:xfrm>
+          <a:prstGeom prst="rect">
+            <a:avLst/>
+          </a:prstGeom>
+        </p:spPr>
+        <p:txBody>
+          <a:bodyPr anchorCtr="0" anchor="t" bIns="91425" lIns="91425" spcFirstLastPara="1" rIns="91425" wrap="square" tIns="91425">
+            <a:normAutofit/>
+          </a:bodyPr>
+          <a:lstStyle/>
+          <a:p>
+            <a:pPr indent="0" lvl="0" marL="0" rtl="0" algn="ctr">
+              <a:spcBef>
+                <a:spcPts val="0"/>
+              </a:spcBef>
+              <a:spcAft>
+                <a:spcPts val="0"/>
+              </a:spcAft>
+              <a:buNone/>
+            </a:pPr>
+            <a:r>
+              <a:rPr lang="pt-BR" sz="3100">
+                <a:solidFill>
+                  <a:srgbClr val="BF9000"/>
+                </a:solidFill>
+              </a:rPr>
+              <a:t>Streamlit repo:</a:t>
+            </a:r>
+            <a:endParaRPr sz="3100">
+              <a:solidFill>
+                <a:srgbClr val="BF9000"/>
+              </a:solidFill>
+            </a:endParaRPr>
+          </a:p>
+          <a:p>
+            <a:pPr indent="0" lvl="0" marL="0" rtl="0" algn="ctr">
+              <a:spcBef>
+                <a:spcPts val="1200"/>
+              </a:spcBef>
+              <a:spcAft>
+                <a:spcPts val="0"/>
+              </a:spcAft>
+              <a:buNone/>
+            </a:pPr>
+            <a:r>
+              <a:t/>
+            </a:r>
+            <a:endParaRPr sz="3100">
+              <a:solidFill>
+                <a:srgbClr val="BF9000"/>
+              </a:solidFill>
+            </a:endParaRPr>
+          </a:p>
+          <a:p>
+            <a:pPr indent="0" lvl="0" marL="0" rtl="0" algn="ctr">
+              <a:spcBef>
+                <a:spcPts val="1200"/>
+              </a:spcBef>
+              <a:spcAft>
+                <a:spcPts val="1200"/>
+              </a:spcAft>
+              <a:buNone/>
+            </a:pPr>
+            <a:r>
+              <a:rPr lang="pt-BR" sz="3100">
+                <a:solidFill>
+                  <a:srgbClr val="BF9000"/>
+                </a:solidFill>
+              </a:rPr>
+              <a:t>https://gene-prediction.streamlit.app/</a:t>
+            </a:r>
+            <a:endParaRPr sz="3100">
               <a:solidFill>
                 <a:srgbClr val="BF9000"/>
               </a:solidFill>
@@ -8372,7 +9129,7 @@
                   <a:srgbClr val="BF9000"/>
                 </a:solidFill>
               </a:rPr>
-              <a:t>merge 4 datasets</a:t>
+              <a:t>Merge 4 datasets</a:t>
             </a:r>
             <a:endParaRPr sz="2100">
               <a:solidFill>
@@ -8400,7 +9157,7 @@
                   <a:srgbClr val="BF9000"/>
                 </a:solidFill>
               </a:rPr>
-              <a:t>rename the synomym GeneIDs as per official names</a:t>
+              <a:t>Rename the synomym GeneIDs as per official names</a:t>
             </a:r>
             <a:endParaRPr sz="2100">
               <a:solidFill>
@@ -8428,7 +9185,7 @@
                   <a:srgbClr val="BF9000"/>
                 </a:solidFill>
               </a:rPr>
-              <a:t>dropped </a:t>
+              <a:t>Dropped </a:t>
             </a:r>
             <a:r>
               <a:rPr lang="pt-BR" sz="2100">
@@ -8464,15 +9221,7 @@
                   <a:srgbClr val="BF9000"/>
                 </a:solidFill>
               </a:rPr>
-              <a:t>dropped </a:t>
-            </a:r>
-            <a:r>
-              <a:rPr lang="pt-BR" sz="2100">
-                <a:solidFill>
-                  <a:srgbClr val="BF9000"/>
-                </a:solidFill>
-              </a:rPr>
-              <a:t>nan</a:t>
+              <a:t>Function (def preprocess_data(df, frac=1))</a:t>
             </a:r>
             <a:endParaRPr sz="2100">
               <a:solidFill>
@@ -8500,7 +9249,7 @@
                   <a:srgbClr val="BF9000"/>
                 </a:solidFill>
               </a:rPr>
-              <a:t>StandardScaler: numerical features</a:t>
+              <a:t>Normalization (StandardScaler): numerical features</a:t>
             </a:r>
             <a:endParaRPr sz="2100">
               <a:solidFill>
@@ -8556,7 +9305,7 @@
                   <a:srgbClr val="BF9000"/>
                 </a:solidFill>
               </a:rPr>
-              <a:t>Label encoder: target</a:t>
+              <a:t>Label encoder: dependent variable</a:t>
             </a:r>
             <a:endParaRPr sz="2100">
               <a:solidFill>
@@ -8604,6 +9353,34 @@
                 </a:solidFill>
               </a:rPr>
               <a:t>Classification method: Logistic Regression and Random Forest</a:t>
+            </a:r>
+            <a:endParaRPr sz="2100">
+              <a:solidFill>
+                <a:srgbClr val="BF9000"/>
+              </a:solidFill>
+            </a:endParaRPr>
+          </a:p>
+          <a:p>
+            <a:pPr indent="-348615" lvl="1" marL="914400" rtl="0" algn="l">
+              <a:spcBef>
+                <a:spcPts val="0"/>
+              </a:spcBef>
+              <a:spcAft>
+                <a:spcPts val="0"/>
+              </a:spcAft>
+              <a:buClr>
+                <a:srgbClr val="BF9000"/>
+              </a:buClr>
+              <a:buSzPct val="100000"/>
+              <a:buChar char="○"/>
+            </a:pPr>
+            <a:r>
+              <a:rPr lang="pt-BR" sz="2100">
+                <a:solidFill>
+                  <a:srgbClr val="BF9000"/>
+                </a:solidFill>
+              </a:rPr>
+              <a:t>Train/Test</a:t>
             </a:r>
             <a:endParaRPr sz="2100">
               <a:solidFill>
@@ -8697,6 +9474,146 @@
         </p:nvSpPr>
         <p:spPr>
           <a:xfrm>
+            <a:off x="311700" y="386700"/>
+            <a:ext cx="8520600" cy="572700"/>
+          </a:xfrm>
+          <a:prstGeom prst="rect">
+            <a:avLst/>
+          </a:prstGeom>
+        </p:spPr>
+        <p:txBody>
+          <a:bodyPr anchorCtr="0" anchor="t" bIns="91425" lIns="91425" spcFirstLastPara="1" rIns="91425" wrap="square" tIns="91425">
+            <a:normAutofit fontScale="90000"/>
+          </a:bodyPr>
+          <a:lstStyle/>
+          <a:p>
+            <a:pPr indent="0" lvl="0" marL="0" rtl="0" algn="l">
+              <a:spcBef>
+                <a:spcPts val="0"/>
+              </a:spcBef>
+              <a:spcAft>
+                <a:spcPts val="0"/>
+              </a:spcAft>
+              <a:buNone/>
+            </a:pPr>
+            <a:r>
+              <a:rPr lang="pt-BR">
+                <a:solidFill>
+                  <a:srgbClr val="BF9000"/>
+                </a:solidFill>
+              </a:rPr>
+              <a:t>Features</a:t>
+            </a:r>
+            <a:endParaRPr>
+              <a:solidFill>
+                <a:srgbClr val="BF9000"/>
+              </a:solidFill>
+            </a:endParaRPr>
+          </a:p>
+        </p:txBody>
+      </p:sp>
+      <p:sp>
+        <p:nvSpPr>
+          <p:cNvPr id="83" name="Google Shape;83;p16"/>
+          <p:cNvSpPr txBox="1"/>
+          <p:nvPr>
+            <p:ph idx="1" type="body"/>
+          </p:nvPr>
+        </p:nvSpPr>
+        <p:spPr>
+          <a:xfrm>
+            <a:off x="311700" y="1152475"/>
+            <a:ext cx="8520600" cy="3416400"/>
+          </a:xfrm>
+          <a:prstGeom prst="rect">
+            <a:avLst/>
+          </a:prstGeom>
+        </p:spPr>
+        <p:txBody>
+          <a:bodyPr anchorCtr="0" anchor="t" bIns="91425" lIns="91425" spcFirstLastPara="1" rIns="91425" wrap="square" tIns="91425">
+            <a:normAutofit/>
+          </a:bodyPr>
+          <a:lstStyle/>
+          <a:p>
+            <a:pPr indent="0" lvl="0" marL="0" rtl="0" algn="l">
+              <a:spcBef>
+                <a:spcPts val="0"/>
+              </a:spcBef>
+              <a:spcAft>
+                <a:spcPts val="1200"/>
+              </a:spcAft>
+              <a:buNone/>
+            </a:pPr>
+            <a:r>
+              <a:t/>
+            </a:r>
+            <a:endParaRPr/>
+          </a:p>
+        </p:txBody>
+      </p:sp>
+      <p:pic>
+        <p:nvPicPr>
+          <p:cNvPr id="84" name="Google Shape;84;p16"/>
+          <p:cNvPicPr preferRelativeResize="0"/>
+          <p:nvPr/>
+        </p:nvPicPr>
+        <p:blipFill>
+          <a:blip r:embed="rId3">
+            <a:alphaModFix/>
+          </a:blip>
+          <a:stretch>
+            <a:fillRect/>
+          </a:stretch>
+        </p:blipFill>
+        <p:spPr>
+          <a:xfrm>
+            <a:off x="139600" y="1152464"/>
+            <a:ext cx="8520599" cy="3592135"/>
+          </a:xfrm>
+          <a:prstGeom prst="rect">
+            <a:avLst/>
+          </a:prstGeom>
+          <a:noFill/>
+          <a:ln>
+            <a:noFill/>
+          </a:ln>
+        </p:spPr>
+      </p:pic>
+    </p:spTree>
+  </p:cSld>
+  <p:clrMapOvr>
+    <a:masterClrMapping/>
+  </p:clrMapOvr>
+</p:sld>
+</file>
+
+<file path=ppt/slides/slide5.xml><?xml version="1.0" encoding="utf-8"?>
+<p:sld xmlns:a="http://schemas.openxmlformats.org/drawingml/2006/main" xmlns:r="http://schemas.openxmlformats.org/officeDocument/2006/relationships" xmlns:mc="http://schemas.openxmlformats.org/markup-compatibility/2006" xmlns:mv="urn:schemas-microsoft-com:mac:vml" xmlns:p="http://schemas.openxmlformats.org/presentationml/2006/main" xmlns:c="http://schemas.openxmlformats.org/drawingml/2006/chart" xmlns:dgm="http://schemas.openxmlformats.org/drawingml/2006/diagram" xmlns:o="urn:schemas-microsoft-com:office:office" xmlns:v="urn:schemas-microsoft-com:vml" xmlns:pvml="urn:schemas-microsoft-com:office:powerpoint" xmlns:com="http://schemas.openxmlformats.org/drawingml/2006/compatibility" xmlns:p14="http://schemas.microsoft.com/office/powerpoint/2010/main" xmlns:p15="http://schemas.microsoft.com/office/powerpoint/2012/main" xmlns:ahyp="http://schemas.microsoft.com/office/drawing/2018/hyperlinkcolor">
+  <p:cSld>
+    <p:spTree>
+      <p:nvGrpSpPr>
+        <p:cNvPr id="88" name="Shape 88"/>
+        <p:cNvGrpSpPr/>
+        <p:nvPr/>
+      </p:nvGrpSpPr>
+      <p:grpSpPr>
+        <a:xfrm>
+          <a:off x="0" y="0"/>
+          <a:ext cx="0" cy="0"/>
+          <a:chOff x="0" y="0"/>
+          <a:chExt cx="0" cy="0"/>
+        </a:xfrm>
+      </p:grpSpPr>
+      <p:sp>
+        <p:nvSpPr>
+          <p:cNvPr id="89" name="Google Shape;89;p17"/>
+          <p:cNvSpPr txBox="1"/>
+          <p:nvPr>
+            <p:ph type="title"/>
+          </p:nvPr>
+        </p:nvSpPr>
+        <p:spPr>
+          <a:xfrm>
             <a:off x="698500" y="654300"/>
             <a:ext cx="7556100" cy="287100"/>
           </a:xfrm>
@@ -8738,7 +9655,7 @@
       </p:sp>
       <p:sp>
         <p:nvSpPr>
-          <p:cNvPr id="83" name="Google Shape;83;p16"/>
+          <p:cNvPr id="90" name="Google Shape;90;p17"/>
           <p:cNvSpPr txBox="1"/>
           <p:nvPr>
             <p:ph type="title"/>
@@ -8802,7 +9719,7 @@
       </p:sp>
       <p:pic>
         <p:nvPicPr>
-          <p:cNvPr id="84" name="Google Shape;84;p16"/>
+          <p:cNvPr id="91" name="Google Shape;91;p17"/>
           <p:cNvPicPr preferRelativeResize="0"/>
           <p:nvPr/>
         </p:nvPicPr>
@@ -8830,7 +9747,7 @@
       </p:pic>
       <p:pic>
         <p:nvPicPr>
-          <p:cNvPr id="85" name="Google Shape;85;p16"/>
+          <p:cNvPr id="92" name="Google Shape;92;p17"/>
           <p:cNvPicPr preferRelativeResize="0"/>
           <p:nvPr/>
         </p:nvPicPr>
@@ -8858,7 +9775,7 @@
       </p:pic>
       <p:sp>
         <p:nvSpPr>
-          <p:cNvPr id="86" name="Google Shape;86;p16"/>
+          <p:cNvPr id="93" name="Google Shape;93;p17"/>
           <p:cNvSpPr txBox="1"/>
           <p:nvPr/>
         </p:nvSpPr>
@@ -8909,7 +9826,7 @@
       </p:sp>
       <p:sp>
         <p:nvSpPr>
-          <p:cNvPr id="87" name="Google Shape;87;p16"/>
+          <p:cNvPr id="94" name="Google Shape;94;p17"/>
           <p:cNvSpPr txBox="1"/>
           <p:nvPr/>
         </p:nvSpPr>
@@ -8966,12 +9883,12 @@
 </p:sld>
 </file>
 
-<file path=ppt/slides/slide5.xml><?xml version="1.0" encoding="utf-8"?>
+<file path=ppt/slides/slide6.xml><?xml version="1.0" encoding="utf-8"?>
 <p:sld xmlns:a="http://schemas.openxmlformats.org/drawingml/2006/main" xmlns:r="http://schemas.openxmlformats.org/officeDocument/2006/relationships" xmlns:mc="http://schemas.openxmlformats.org/markup-compatibility/2006" xmlns:mv="urn:schemas-microsoft-com:mac:vml" xmlns:p="http://schemas.openxmlformats.org/presentationml/2006/main" xmlns:c="http://schemas.openxmlformats.org/drawingml/2006/chart" xmlns:dgm="http://schemas.openxmlformats.org/drawingml/2006/diagram" xmlns:o="urn:schemas-microsoft-com:office:office" xmlns:v="urn:schemas-microsoft-com:vml" xmlns:pvml="urn:schemas-microsoft-com:office:powerpoint" xmlns:com="http://schemas.openxmlformats.org/drawingml/2006/compatibility" xmlns:p14="http://schemas.microsoft.com/office/powerpoint/2010/main" xmlns:p15="http://schemas.microsoft.com/office/powerpoint/2012/main" xmlns:ahyp="http://schemas.microsoft.com/office/drawing/2018/hyperlinkcolor">
   <p:cSld>
     <p:spTree>
       <p:nvGrpSpPr>
-        <p:cNvPr id="91" name="Shape 91"/>
+        <p:cNvPr id="98" name="Shape 98"/>
         <p:cNvGrpSpPr/>
         <p:nvPr/>
       </p:nvGrpSpPr>
@@ -8985,7 +9902,7 @@
       </p:grpSpPr>
       <p:sp>
         <p:nvSpPr>
-          <p:cNvPr id="92" name="Google Shape;92;p17"/>
+          <p:cNvPr id="99" name="Google Shape;99;p18"/>
           <p:cNvSpPr txBox="1"/>
           <p:nvPr>
             <p:ph idx="1" type="body"/>
@@ -9024,7 +9941,7 @@
       </p:sp>
       <p:sp>
         <p:nvSpPr>
-          <p:cNvPr id="93" name="Google Shape;93;p17"/>
+          <p:cNvPr id="100" name="Google Shape;100;p18"/>
           <p:cNvSpPr txBox="1"/>
           <p:nvPr>
             <p:ph type="title"/>
@@ -9126,7 +10043,7 @@
       </p:sp>
       <p:pic>
         <p:nvPicPr>
-          <p:cNvPr id="94" name="Google Shape;94;p17"/>
+          <p:cNvPr id="101" name="Google Shape;101;p18"/>
           <p:cNvPicPr preferRelativeResize="0"/>
           <p:nvPr/>
         </p:nvPicPr>
@@ -9154,7 +10071,7 @@
       </p:pic>
       <p:sp>
         <p:nvSpPr>
-          <p:cNvPr id="95" name="Google Shape;95;p17"/>
+          <p:cNvPr id="102" name="Google Shape;102;p18"/>
           <p:cNvSpPr/>
           <p:nvPr/>
         </p:nvSpPr>
@@ -9206,7 +10123,7 @@
       </p:sp>
       <p:sp>
         <p:nvSpPr>
-          <p:cNvPr id="96" name="Google Shape;96;p17"/>
+          <p:cNvPr id="103" name="Google Shape;103;p18"/>
           <p:cNvSpPr txBox="1"/>
           <p:nvPr>
             <p:ph type="title"/>
@@ -9729,7 +10646,7 @@
       </p:sp>
       <p:sp>
         <p:nvSpPr>
-          <p:cNvPr id="97" name="Google Shape;97;p17"/>
+          <p:cNvPr id="104" name="Google Shape;104;p18"/>
           <p:cNvSpPr txBox="1"/>
           <p:nvPr/>
         </p:nvSpPr>
@@ -9785,12 +10702,12 @@
 </p:sld>
 </file>
 
-<file path=ppt/slides/slide6.xml><?xml version="1.0" encoding="utf-8"?>
+<file path=ppt/slides/slide7.xml><?xml version="1.0" encoding="utf-8"?>
 <p:sld xmlns:a="http://schemas.openxmlformats.org/drawingml/2006/main" xmlns:r="http://schemas.openxmlformats.org/officeDocument/2006/relationships" xmlns:mc="http://schemas.openxmlformats.org/markup-compatibility/2006" xmlns:mv="urn:schemas-microsoft-com:mac:vml" xmlns:p="http://schemas.openxmlformats.org/presentationml/2006/main" xmlns:c="http://schemas.openxmlformats.org/drawingml/2006/chart" xmlns:dgm="http://schemas.openxmlformats.org/drawingml/2006/diagram" xmlns:o="urn:schemas-microsoft-com:office:office" xmlns:v="urn:schemas-microsoft-com:vml" xmlns:pvml="urn:schemas-microsoft-com:office:powerpoint" xmlns:com="http://schemas.openxmlformats.org/drawingml/2006/compatibility" xmlns:p14="http://schemas.microsoft.com/office/powerpoint/2010/main" xmlns:p15="http://schemas.microsoft.com/office/powerpoint/2012/main" xmlns:ahyp="http://schemas.microsoft.com/office/drawing/2018/hyperlinkcolor">
   <p:cSld>
     <p:spTree>
       <p:nvGrpSpPr>
-        <p:cNvPr id="101" name="Shape 101"/>
+        <p:cNvPr id="108" name="Shape 108"/>
         <p:cNvGrpSpPr/>
         <p:nvPr/>
       </p:nvGrpSpPr>
@@ -9804,7 +10721,7 @@
       </p:grpSpPr>
       <p:sp>
         <p:nvSpPr>
-          <p:cNvPr id="102" name="Google Shape;102;p18"/>
+          <p:cNvPr id="109" name="Google Shape;109;p19"/>
           <p:cNvSpPr txBox="1"/>
           <p:nvPr>
             <p:ph type="title"/>
@@ -9860,7 +10777,7 @@
       </p:sp>
       <p:sp>
         <p:nvSpPr>
-          <p:cNvPr id="103" name="Google Shape;103;p18"/>
+          <p:cNvPr id="110" name="Google Shape;110;p19"/>
           <p:cNvSpPr txBox="1"/>
           <p:nvPr>
             <p:ph type="title"/>
@@ -9908,87 +10825,12 @@
       </p:sp>
       <p:pic>
         <p:nvPicPr>
-          <p:cNvPr id="104" name="Google Shape;104;p18"/>
+          <p:cNvPr id="111" name="Google Shape;111;p19"/>
           <p:cNvPicPr preferRelativeResize="0"/>
           <p:nvPr/>
         </p:nvPicPr>
         <p:blipFill>
           <a:blip r:embed="rId3">
-            <a:alphaModFix/>
-          </a:blip>
-          <a:stretch>
-            <a:fillRect/>
-          </a:stretch>
-        </p:blipFill>
-        <p:spPr>
-          <a:xfrm>
-            <a:off x="5497718" y="987800"/>
-            <a:ext cx="3084307" cy="3793024"/>
-          </a:xfrm>
-          <a:prstGeom prst="rect">
-            <a:avLst/>
-          </a:prstGeom>
-          <a:noFill/>
-          <a:ln>
-            <a:noFill/>
-          </a:ln>
-        </p:spPr>
-      </p:pic>
-      <p:sp>
-        <p:nvSpPr>
-          <p:cNvPr id="105" name="Google Shape;105;p18"/>
-          <p:cNvSpPr/>
-          <p:nvPr/>
-        </p:nvSpPr>
-        <p:spPr>
-          <a:xfrm>
-            <a:off x="5856650" y="1254950"/>
-            <a:ext cx="2253600" cy="1098300"/>
-          </a:xfrm>
-          <a:prstGeom prst="rect">
-            <a:avLst/>
-          </a:prstGeom>
-          <a:noFill/>
-          <a:ln cap="flat" cmpd="sng" w="9525">
-            <a:solidFill>
-              <a:srgbClr val="00FF00"/>
-            </a:solidFill>
-            <a:prstDash val="solid"/>
-            <a:round/>
-            <a:headEnd len="sm" w="sm" type="none"/>
-            <a:tailEnd len="sm" w="sm" type="none"/>
-          </a:ln>
-        </p:spPr>
-        <p:txBody>
-          <a:bodyPr anchorCtr="0" anchor="ctr" bIns="91425" lIns="91425" spcFirstLastPara="1" rIns="91425" wrap="square" tIns="91425">
-            <a:noAutofit/>
-          </a:bodyPr>
-          <a:lstStyle/>
-          <a:p>
-            <a:pPr indent="0" lvl="0" marL="0" rtl="0" algn="ctr">
-              <a:spcBef>
-                <a:spcPts val="0"/>
-              </a:spcBef>
-              <a:spcAft>
-                <a:spcPts val="0"/>
-              </a:spcAft>
-              <a:buNone/>
-            </a:pPr>
-            <a:r>
-              <a:t/>
-            </a:r>
-            <a:endParaRPr/>
-          </a:p>
-        </p:txBody>
-      </p:sp>
-      <p:pic>
-        <p:nvPicPr>
-          <p:cNvPr id="106" name="Google Shape;106;p18"/>
-          <p:cNvPicPr preferRelativeResize="0"/>
-          <p:nvPr/>
-        </p:nvPicPr>
-        <p:blipFill>
-          <a:blip r:embed="rId4">
             <a:alphaModFix/>
           </a:blip>
           <a:stretch>
@@ -10011,7 +10853,7 @@
       </p:pic>
       <p:sp>
         <p:nvSpPr>
-          <p:cNvPr id="107" name="Google Shape;107;p18"/>
+          <p:cNvPr id="112" name="Google Shape;112;p19"/>
           <p:cNvSpPr/>
           <p:nvPr/>
         </p:nvSpPr>
@@ -10056,6 +10898,81 @@
           </a:p>
         </p:txBody>
       </p:sp>
+      <p:pic>
+        <p:nvPicPr>
+          <p:cNvPr id="113" name="Google Shape;113;p19"/>
+          <p:cNvPicPr preferRelativeResize="0"/>
+          <p:nvPr/>
+        </p:nvPicPr>
+        <p:blipFill>
+          <a:blip r:embed="rId4">
+            <a:alphaModFix/>
+          </a:blip>
+          <a:stretch>
+            <a:fillRect/>
+          </a:stretch>
+        </p:blipFill>
+        <p:spPr>
+          <a:xfrm>
+            <a:off x="5570325" y="1007238"/>
+            <a:ext cx="3007150" cy="3754149"/>
+          </a:xfrm>
+          <a:prstGeom prst="rect">
+            <a:avLst/>
+          </a:prstGeom>
+          <a:noFill/>
+          <a:ln>
+            <a:noFill/>
+          </a:ln>
+        </p:spPr>
+      </p:pic>
+      <p:sp>
+        <p:nvSpPr>
+          <p:cNvPr id="114" name="Google Shape;114;p19"/>
+          <p:cNvSpPr/>
+          <p:nvPr/>
+        </p:nvSpPr>
+        <p:spPr>
+          <a:xfrm>
+            <a:off x="5662925" y="1211150"/>
+            <a:ext cx="2253600" cy="1098300"/>
+          </a:xfrm>
+          <a:prstGeom prst="rect">
+            <a:avLst/>
+          </a:prstGeom>
+          <a:noFill/>
+          <a:ln cap="flat" cmpd="sng" w="9525">
+            <a:solidFill>
+              <a:srgbClr val="00FF00"/>
+            </a:solidFill>
+            <a:prstDash val="solid"/>
+            <a:round/>
+            <a:headEnd len="sm" w="sm" type="none"/>
+            <a:tailEnd len="sm" w="sm" type="none"/>
+          </a:ln>
+        </p:spPr>
+        <p:txBody>
+          <a:bodyPr anchorCtr="0" anchor="ctr" bIns="91425" lIns="91425" spcFirstLastPara="1" rIns="91425" wrap="square" tIns="91425">
+            <a:noAutofit/>
+          </a:bodyPr>
+          <a:lstStyle/>
+          <a:p>
+            <a:pPr indent="0" lvl="0" marL="0" rtl="0" algn="ctr">
+              <a:spcBef>
+                <a:spcPts val="0"/>
+              </a:spcBef>
+              <a:spcAft>
+                <a:spcPts val="0"/>
+              </a:spcAft>
+              <a:buNone/>
+            </a:pPr>
+            <a:r>
+              <a:t/>
+            </a:r>
+            <a:endParaRPr/>
+          </a:p>
+        </p:txBody>
+      </p:sp>
     </p:spTree>
   </p:cSld>
   <p:clrMapOvr>
@@ -10064,12 +10981,12 @@
 </p:sld>
 </file>
 
-<file path=ppt/slides/slide7.xml><?xml version="1.0" encoding="utf-8"?>
+<file path=ppt/slides/slide8.xml><?xml version="1.0" encoding="utf-8"?>
 <p:sld xmlns:a="http://schemas.openxmlformats.org/drawingml/2006/main" xmlns:r="http://schemas.openxmlformats.org/officeDocument/2006/relationships" xmlns:mc="http://schemas.openxmlformats.org/markup-compatibility/2006" xmlns:mv="urn:schemas-microsoft-com:mac:vml" xmlns:p="http://schemas.openxmlformats.org/presentationml/2006/main" xmlns:c="http://schemas.openxmlformats.org/drawingml/2006/chart" xmlns:dgm="http://schemas.openxmlformats.org/drawingml/2006/diagram" xmlns:o="urn:schemas-microsoft-com:office:office" xmlns:v="urn:schemas-microsoft-com:vml" xmlns:pvml="urn:schemas-microsoft-com:office:powerpoint" xmlns:com="http://schemas.openxmlformats.org/drawingml/2006/compatibility" xmlns:p14="http://schemas.microsoft.com/office/powerpoint/2010/main" xmlns:p15="http://schemas.microsoft.com/office/powerpoint/2012/main" xmlns:ahyp="http://schemas.microsoft.com/office/drawing/2018/hyperlinkcolor">
   <p:cSld>
     <p:spTree>
       <p:nvGrpSpPr>
-        <p:cNvPr id="111" name="Shape 111"/>
+        <p:cNvPr id="118" name="Shape 118"/>
         <p:cNvGrpSpPr/>
         <p:nvPr/>
       </p:nvGrpSpPr>
@@ -10083,7 +11000,7 @@
       </p:grpSpPr>
       <p:sp>
         <p:nvSpPr>
-          <p:cNvPr id="112" name="Google Shape;112;p19"/>
+          <p:cNvPr id="119" name="Google Shape;119;p20"/>
           <p:cNvSpPr txBox="1"/>
           <p:nvPr>
             <p:ph idx="1" type="body"/>
@@ -10122,7 +11039,7 @@
       </p:sp>
       <p:sp>
         <p:nvSpPr>
-          <p:cNvPr id="113" name="Google Shape;113;p19"/>
+          <p:cNvPr id="120" name="Google Shape;120;p20"/>
           <p:cNvSpPr txBox="1"/>
           <p:nvPr>
             <p:ph type="title"/>
@@ -10191,7 +11108,7 @@
       </p:sp>
       <p:sp>
         <p:nvSpPr>
-          <p:cNvPr id="114" name="Google Shape;114;p19"/>
+          <p:cNvPr id="121" name="Google Shape;121;p20"/>
           <p:cNvSpPr/>
           <p:nvPr/>
         </p:nvSpPr>
@@ -10243,7 +11160,7 @@
       </p:sp>
       <p:sp>
         <p:nvSpPr>
-          <p:cNvPr id="115" name="Google Shape;115;p19"/>
+          <p:cNvPr id="122" name="Google Shape;122;p20"/>
           <p:cNvSpPr txBox="1"/>
           <p:nvPr>
             <p:ph type="title"/>
@@ -10892,7 +11809,7 @@
       </p:sp>
       <p:sp>
         <p:nvSpPr>
-          <p:cNvPr id="116" name="Google Shape;116;p19"/>
+          <p:cNvPr id="123" name="Google Shape;123;p20"/>
           <p:cNvSpPr txBox="1"/>
           <p:nvPr/>
         </p:nvSpPr>
@@ -10942,7 +11859,7 @@
       </p:sp>
       <p:pic>
         <p:nvPicPr>
-          <p:cNvPr id="117" name="Google Shape;117;p19"/>
+          <p:cNvPr id="124" name="Google Shape;124;p20"/>
           <p:cNvPicPr preferRelativeResize="0"/>
           <p:nvPr/>
         </p:nvPicPr>
@@ -10976,12 +11893,12 @@
 </p:sld>
 </file>
 
-<file path=ppt/slides/slide8.xml><?xml version="1.0" encoding="utf-8"?>
+<file path=ppt/slides/slide9.xml><?xml version="1.0" encoding="utf-8"?>
 <p:sld xmlns:a="http://schemas.openxmlformats.org/drawingml/2006/main" xmlns:r="http://schemas.openxmlformats.org/officeDocument/2006/relationships" xmlns:mc="http://schemas.openxmlformats.org/markup-compatibility/2006" xmlns:mv="urn:schemas-microsoft-com:mac:vml" xmlns:p="http://schemas.openxmlformats.org/presentationml/2006/main" xmlns:c="http://schemas.openxmlformats.org/drawingml/2006/chart" xmlns:dgm="http://schemas.openxmlformats.org/drawingml/2006/diagram" xmlns:o="urn:schemas-microsoft-com:office:office" xmlns:v="urn:schemas-microsoft-com:vml" xmlns:pvml="urn:schemas-microsoft-com:office:powerpoint" xmlns:com="http://schemas.openxmlformats.org/drawingml/2006/compatibility" xmlns:p14="http://schemas.microsoft.com/office/powerpoint/2010/main" xmlns:p15="http://schemas.microsoft.com/office/powerpoint/2012/main" xmlns:ahyp="http://schemas.microsoft.com/office/drawing/2018/hyperlinkcolor">
   <p:cSld>
     <p:spTree>
       <p:nvGrpSpPr>
-        <p:cNvPr id="121" name="Shape 121"/>
+        <p:cNvPr id="128" name="Shape 128"/>
         <p:cNvGrpSpPr/>
         <p:nvPr/>
       </p:nvGrpSpPr>
@@ -10995,7 +11912,7 @@
       </p:grpSpPr>
       <p:sp>
         <p:nvSpPr>
-          <p:cNvPr id="122" name="Google Shape;122;p20"/>
+          <p:cNvPr id="129" name="Google Shape;129;p21"/>
           <p:cNvSpPr txBox="1"/>
           <p:nvPr>
             <p:ph type="title"/>
@@ -11043,7 +11960,7 @@
       </p:sp>
       <p:sp>
         <p:nvSpPr>
-          <p:cNvPr id="123" name="Google Shape;123;p20"/>
+          <p:cNvPr id="130" name="Google Shape;130;p21"/>
           <p:cNvSpPr txBox="1"/>
           <p:nvPr>
             <p:ph type="title"/>
@@ -11091,87 +12008,12 @@
       </p:sp>
       <p:pic>
         <p:nvPicPr>
-          <p:cNvPr id="124" name="Google Shape;124;p20"/>
+          <p:cNvPr id="131" name="Google Shape;131;p21"/>
           <p:cNvPicPr preferRelativeResize="0"/>
           <p:nvPr/>
         </p:nvPicPr>
         <p:blipFill>
           <a:blip r:embed="rId3">
-            <a:alphaModFix/>
-          </a:blip>
-          <a:stretch>
-            <a:fillRect/>
-          </a:stretch>
-        </p:blipFill>
-        <p:spPr>
-          <a:xfrm>
-            <a:off x="5692075" y="1188550"/>
-            <a:ext cx="2692225" cy="3380349"/>
-          </a:xfrm>
-          <a:prstGeom prst="rect">
-            <a:avLst/>
-          </a:prstGeom>
-          <a:noFill/>
-          <a:ln>
-            <a:noFill/>
-          </a:ln>
-        </p:spPr>
-      </p:pic>
-      <p:sp>
-        <p:nvSpPr>
-          <p:cNvPr id="125" name="Google Shape;125;p20"/>
-          <p:cNvSpPr/>
-          <p:nvPr/>
-        </p:nvSpPr>
-        <p:spPr>
-          <a:xfrm>
-            <a:off x="5736500" y="1398700"/>
-            <a:ext cx="2248800" cy="1060200"/>
-          </a:xfrm>
-          <a:prstGeom prst="rect">
-            <a:avLst/>
-          </a:prstGeom>
-          <a:noFill/>
-          <a:ln cap="flat" cmpd="sng" w="9525">
-            <a:solidFill>
-              <a:srgbClr val="00FF00"/>
-            </a:solidFill>
-            <a:prstDash val="solid"/>
-            <a:round/>
-            <a:headEnd len="sm" w="sm" type="none"/>
-            <a:tailEnd len="sm" w="sm" type="none"/>
-          </a:ln>
-        </p:spPr>
-        <p:txBody>
-          <a:bodyPr anchorCtr="0" anchor="ctr" bIns="91425" lIns="91425" spcFirstLastPara="1" rIns="91425" wrap="square" tIns="91425">
-            <a:noAutofit/>
-          </a:bodyPr>
-          <a:lstStyle/>
-          <a:p>
-            <a:pPr indent="0" lvl="0" marL="0" rtl="0" algn="ctr">
-              <a:spcBef>
-                <a:spcPts val="0"/>
-              </a:spcBef>
-              <a:spcAft>
-                <a:spcPts val="0"/>
-              </a:spcAft>
-              <a:buNone/>
-            </a:pPr>
-            <a:r>
-              <a:t/>
-            </a:r>
-            <a:endParaRPr/>
-          </a:p>
-        </p:txBody>
-      </p:sp>
-      <p:pic>
-        <p:nvPicPr>
-          <p:cNvPr id="126" name="Google Shape;126;p20"/>
-          <p:cNvPicPr preferRelativeResize="0"/>
-          <p:nvPr/>
-        </p:nvPicPr>
-        <p:blipFill>
-          <a:blip r:embed="rId4">
             <a:alphaModFix/>
           </a:blip>
           <a:stretch>
@@ -11194,7 +12036,7 @@
       </p:pic>
       <p:sp>
         <p:nvSpPr>
-          <p:cNvPr id="127" name="Google Shape;127;p20"/>
+          <p:cNvPr id="132" name="Google Shape;132;p21"/>
           <p:cNvSpPr/>
           <p:nvPr/>
         </p:nvSpPr>
@@ -11239,375 +12081,14 @@
           </a:p>
         </p:txBody>
       </p:sp>
-    </p:spTree>
-  </p:cSld>
-  <p:clrMapOvr>
-    <a:masterClrMapping/>
-  </p:clrMapOvr>
-</p:sld>
-</file>
-
-<file path=ppt/slides/slide9.xml><?xml version="1.0" encoding="utf-8"?>
-<p:sld xmlns:a="http://schemas.openxmlformats.org/drawingml/2006/main" xmlns:r="http://schemas.openxmlformats.org/officeDocument/2006/relationships" xmlns:mc="http://schemas.openxmlformats.org/markup-compatibility/2006" xmlns:mv="urn:schemas-microsoft-com:mac:vml" xmlns:p="http://schemas.openxmlformats.org/presentationml/2006/main" xmlns:c="http://schemas.openxmlformats.org/drawingml/2006/chart" xmlns:dgm="http://schemas.openxmlformats.org/drawingml/2006/diagram" xmlns:o="urn:schemas-microsoft-com:office:office" xmlns:v="urn:schemas-microsoft-com:vml" xmlns:pvml="urn:schemas-microsoft-com:office:powerpoint" xmlns:com="http://schemas.openxmlformats.org/drawingml/2006/compatibility" xmlns:p14="http://schemas.microsoft.com/office/powerpoint/2010/main" xmlns:p15="http://schemas.microsoft.com/office/powerpoint/2012/main" xmlns:ahyp="http://schemas.microsoft.com/office/drawing/2018/hyperlinkcolor">
-  <p:cSld>
-    <p:spTree>
-      <p:nvGrpSpPr>
-        <p:cNvPr id="131" name="Shape 131"/>
-        <p:cNvGrpSpPr/>
-        <p:nvPr/>
-      </p:nvGrpSpPr>
-      <p:grpSpPr>
-        <a:xfrm>
-          <a:off x="0" y="0"/>
-          <a:ext cx="0" cy="0"/>
-          <a:chOff x="0" y="0"/>
-          <a:chExt cx="0" cy="0"/>
-        </a:xfrm>
-      </p:grpSpPr>
-      <p:sp>
-        <p:nvSpPr>
-          <p:cNvPr id="132" name="Google Shape;132;p21"/>
-          <p:cNvSpPr txBox="1"/>
-          <p:nvPr>
-            <p:ph type="title"/>
-          </p:nvPr>
-        </p:nvSpPr>
-        <p:spPr>
-          <a:xfrm>
-            <a:off x="364975" y="69500"/>
-            <a:ext cx="8428200" cy="572700"/>
-          </a:xfrm>
-          <a:prstGeom prst="rect">
-            <a:avLst/>
-          </a:prstGeom>
-        </p:spPr>
-        <p:txBody>
-          <a:bodyPr anchorCtr="0" anchor="t" bIns="91425" lIns="91425" spcFirstLastPara="1" rIns="91425" wrap="square" tIns="91425">
-            <a:noAutofit/>
-          </a:bodyPr>
-          <a:lstStyle/>
-          <a:p>
-            <a:pPr indent="0" lvl="0" marL="0" rtl="0" algn="ctr">
-              <a:spcBef>
-                <a:spcPts val="0"/>
-              </a:spcBef>
-              <a:spcAft>
-                <a:spcPts val="0"/>
-              </a:spcAft>
-              <a:buNone/>
-            </a:pPr>
-            <a:r>
-              <a:rPr lang="pt-BR" sz="4000">
-                <a:solidFill>
-                  <a:srgbClr val="BF9000"/>
-                </a:solidFill>
-              </a:rPr>
-              <a:t>Final Considerations</a:t>
-            </a:r>
-            <a:endParaRPr sz="4000">
-              <a:solidFill>
-                <a:srgbClr val="BF9000"/>
-              </a:solidFill>
-            </a:endParaRPr>
-          </a:p>
-        </p:txBody>
-      </p:sp>
-      <p:sp>
-        <p:nvSpPr>
-          <p:cNvPr id="133" name="Google Shape;133;p21"/>
-          <p:cNvSpPr txBox="1"/>
-          <p:nvPr>
-            <p:ph idx="1" type="body"/>
-          </p:nvPr>
-        </p:nvSpPr>
-        <p:spPr>
-          <a:xfrm>
-            <a:off x="2803525" y="970400"/>
-            <a:ext cx="6086100" cy="3858000"/>
-          </a:xfrm>
-          <a:prstGeom prst="rect">
-            <a:avLst/>
-          </a:prstGeom>
-        </p:spPr>
-        <p:txBody>
-          <a:bodyPr anchorCtr="0" anchor="t" bIns="91425" lIns="91425" spcFirstLastPara="1" rIns="91425" wrap="square" tIns="91425">
-            <a:normAutofit fontScale="25000" lnSpcReduction="20000"/>
-          </a:bodyPr>
-          <a:lstStyle/>
-          <a:p>
-            <a:pPr indent="0" lvl="0" marL="0" rtl="0" algn="just">
-              <a:lnSpc>
-                <a:spcPct val="100000"/>
-              </a:lnSpc>
-              <a:spcBef>
-                <a:spcPts val="0"/>
-              </a:spcBef>
-              <a:spcAft>
-                <a:spcPts val="0"/>
-              </a:spcAft>
-              <a:buNone/>
-            </a:pPr>
-            <a:r>
-              <a:rPr lang="pt-BR" sz="6550">
-                <a:solidFill>
-                  <a:srgbClr val="BF9000"/>
-                </a:solidFill>
-              </a:rPr>
-              <a:t>The machine learning model demonstrates strong performance in predicting breast cancer-related genes/proteins. The overall accuracy of the model is 95%, indicating that the model correctly predicts the gene/protein in 95% of the cases.</a:t>
-            </a:r>
-            <a:br>
-              <a:rPr lang="pt-BR" sz="6550">
-                <a:solidFill>
-                  <a:srgbClr val="BF9000"/>
-                </a:solidFill>
-              </a:rPr>
-            </a:br>
-            <a:endParaRPr sz="6550">
-              <a:solidFill>
-                <a:srgbClr val="BF9000"/>
-              </a:solidFill>
-            </a:endParaRPr>
-          </a:p>
-          <a:p>
-            <a:pPr indent="-332581" lvl="0" marL="457200" rtl="0" algn="just">
-              <a:lnSpc>
-                <a:spcPct val="100000"/>
-              </a:lnSpc>
-              <a:spcBef>
-                <a:spcPts val="0"/>
-              </a:spcBef>
-              <a:spcAft>
-                <a:spcPts val="0"/>
-              </a:spcAft>
-              <a:buClr>
-                <a:srgbClr val="BF9000"/>
-              </a:buClr>
-              <a:buSzPct val="100000"/>
-              <a:buChar char="●"/>
-            </a:pPr>
-            <a:r>
-              <a:rPr lang="pt-BR" sz="6550">
-                <a:solidFill>
-                  <a:srgbClr val="BF9000"/>
-                </a:solidFill>
-              </a:rPr>
-              <a:t>Classes 4 and 5 represent genes whose mutations are not very impactful. This likely means that the characteristics of these mutations are more homogeneous and less complex, making it easier for the model to classify them correctly. As a result, the model exhibits high precision, recall, and F1-score for these classes, demonstrating its efficiency in handling less impactful mutations.</a:t>
-            </a:r>
-            <a:endParaRPr sz="6550">
-              <a:solidFill>
-                <a:srgbClr val="BF9000"/>
-              </a:solidFill>
-            </a:endParaRPr>
-          </a:p>
-          <a:p>
-            <a:pPr indent="0" lvl="0" marL="0" rtl="0" algn="just">
-              <a:lnSpc>
-                <a:spcPct val="100000"/>
-              </a:lnSpc>
-              <a:spcBef>
-                <a:spcPts val="0"/>
-              </a:spcBef>
-              <a:spcAft>
-                <a:spcPts val="0"/>
-              </a:spcAft>
-              <a:buNone/>
-            </a:pPr>
-            <a:r>
-              <a:t/>
-            </a:r>
-            <a:endParaRPr sz="5600">
-              <a:solidFill>
-                <a:srgbClr val="BF9000"/>
-              </a:solidFill>
-            </a:endParaRPr>
-          </a:p>
-          <a:p>
-            <a:pPr indent="0" lvl="0" marL="0" rtl="0" algn="l">
-              <a:lnSpc>
-                <a:spcPct val="100000"/>
-              </a:lnSpc>
-              <a:spcBef>
-                <a:spcPts val="0"/>
-              </a:spcBef>
-              <a:spcAft>
-                <a:spcPts val="0"/>
-              </a:spcAft>
-              <a:buNone/>
-            </a:pPr>
-            <a:r>
-              <a:t/>
-            </a:r>
-            <a:endParaRPr sz="5600">
-              <a:solidFill>
-                <a:srgbClr val="BF9000"/>
-              </a:solidFill>
-            </a:endParaRPr>
-          </a:p>
-          <a:p>
-            <a:pPr indent="0" lvl="0" marL="0" rtl="0" algn="l">
-              <a:lnSpc>
-                <a:spcPct val="100000"/>
-              </a:lnSpc>
-              <a:spcBef>
-                <a:spcPts val="0"/>
-              </a:spcBef>
-              <a:spcAft>
-                <a:spcPts val="0"/>
-              </a:spcAft>
-              <a:buNone/>
-            </a:pPr>
-            <a:r>
-              <a:t/>
-            </a:r>
-            <a:endParaRPr sz="5600">
-              <a:solidFill>
-                <a:srgbClr val="BF9000"/>
-              </a:solidFill>
-            </a:endParaRPr>
-          </a:p>
-          <a:p>
-            <a:pPr indent="0" lvl="0" marL="0" rtl="0" algn="l">
-              <a:lnSpc>
-                <a:spcPct val="100000"/>
-              </a:lnSpc>
-              <a:spcBef>
-                <a:spcPts val="0"/>
-              </a:spcBef>
-              <a:spcAft>
-                <a:spcPts val="0"/>
-              </a:spcAft>
-              <a:buNone/>
-            </a:pPr>
-            <a:r>
-              <a:t/>
-            </a:r>
-            <a:endParaRPr sz="5600">
-              <a:solidFill>
-                <a:srgbClr val="BF9000"/>
-              </a:solidFill>
-            </a:endParaRPr>
-          </a:p>
-          <a:p>
-            <a:pPr indent="0" lvl="0" marL="0" rtl="0" algn="l">
-              <a:lnSpc>
-                <a:spcPct val="100000"/>
-              </a:lnSpc>
-              <a:spcBef>
-                <a:spcPts val="0"/>
-              </a:spcBef>
-              <a:spcAft>
-                <a:spcPts val="0"/>
-              </a:spcAft>
-              <a:buNone/>
-            </a:pPr>
-            <a:r>
-              <a:rPr lang="pt-BR" sz="5600">
-                <a:solidFill>
-                  <a:srgbClr val="BF9000"/>
-                </a:solidFill>
-              </a:rPr>
-              <a:t>Benchmark: over 90%</a:t>
-            </a:r>
-            <a:endParaRPr sz="5600">
-              <a:solidFill>
-                <a:srgbClr val="BF9000"/>
-              </a:solidFill>
-            </a:endParaRPr>
-          </a:p>
-          <a:p>
-            <a:pPr indent="0" lvl="0" marL="0" rtl="0" algn="l">
-              <a:lnSpc>
-                <a:spcPct val="100000"/>
-              </a:lnSpc>
-              <a:spcBef>
-                <a:spcPts val="0"/>
-              </a:spcBef>
-              <a:spcAft>
-                <a:spcPts val="0"/>
-              </a:spcAft>
-              <a:buNone/>
-            </a:pPr>
-            <a:r>
-              <a:rPr lang="pt-BR" sz="5600">
-                <a:solidFill>
-                  <a:srgbClr val="BF9000"/>
-                </a:solidFill>
-              </a:rPr>
-              <a:t>source: </a:t>
-            </a:r>
-            <a:r>
-              <a:rPr i="1" lang="pt-BR" sz="5600">
-                <a:solidFill>
-                  <a:srgbClr val="BF9000"/>
-                </a:solidFill>
-              </a:rPr>
-              <a:t>Benchmarking 50 classification algorithms on 50 gene-expression datasets</a:t>
-            </a:r>
-            <a:endParaRPr i="1" sz="5600">
-              <a:solidFill>
-                <a:srgbClr val="BF9000"/>
-              </a:solidFill>
-            </a:endParaRPr>
-          </a:p>
-          <a:p>
-            <a:pPr indent="0" lvl="0" marL="0" rtl="0" algn="l">
-              <a:lnSpc>
-                <a:spcPct val="100000"/>
-              </a:lnSpc>
-              <a:spcBef>
-                <a:spcPts val="0"/>
-              </a:spcBef>
-              <a:spcAft>
-                <a:spcPts val="0"/>
-              </a:spcAft>
-              <a:buNone/>
-            </a:pPr>
-            <a:r>
-              <a:rPr lang="pt-BR" sz="2523">
-                <a:solidFill>
-                  <a:srgbClr val="BF9000"/>
-                </a:solidFill>
-              </a:rPr>
-              <a:t>https://www.biorxiv.org/content/10.1101/2021.05.07.442940v1.full</a:t>
-            </a:r>
-            <a:endParaRPr sz="2523">
-              <a:solidFill>
-                <a:srgbClr val="BF9000"/>
-              </a:solidFill>
-            </a:endParaRPr>
-          </a:p>
-          <a:p>
-            <a:pPr indent="0" lvl="0" marL="0" rtl="0" algn="l">
-              <a:lnSpc>
-                <a:spcPct val="100000"/>
-              </a:lnSpc>
-              <a:spcBef>
-                <a:spcPts val="0"/>
-              </a:spcBef>
-              <a:spcAft>
-                <a:spcPts val="0"/>
-              </a:spcAft>
-              <a:buNone/>
-            </a:pPr>
-            <a:r>
-              <a:t/>
-            </a:r>
-            <a:endParaRPr sz="5600">
-              <a:solidFill>
-                <a:srgbClr val="BF9000"/>
-              </a:solidFill>
-            </a:endParaRPr>
-          </a:p>
-        </p:txBody>
-      </p:sp>
       <p:pic>
         <p:nvPicPr>
-          <p:cNvPr id="134" name="Google Shape;134;p21"/>
+          <p:cNvPr id="133" name="Google Shape;133;p21"/>
           <p:cNvPicPr preferRelativeResize="0"/>
           <p:nvPr/>
         </p:nvPicPr>
         <p:blipFill>
-          <a:blip r:embed="rId3">
+          <a:blip r:embed="rId4">
             <a:alphaModFix/>
           </a:blip>
           <a:stretch>
@@ -11616,8 +12097,8 @@
         </p:blipFill>
         <p:spPr>
           <a:xfrm>
-            <a:off x="205800" y="970400"/>
-            <a:ext cx="2523500" cy="3159075"/>
+            <a:off x="5639100" y="1255000"/>
+            <a:ext cx="2662274" cy="3296149"/>
           </a:xfrm>
           <a:prstGeom prst="rect">
             <a:avLst/>
@@ -11628,6 +12109,53 @@
           </a:ln>
         </p:spPr>
       </p:pic>
+      <p:sp>
+        <p:nvSpPr>
+          <p:cNvPr id="134" name="Google Shape;134;p21"/>
+          <p:cNvSpPr/>
+          <p:nvPr/>
+        </p:nvSpPr>
+        <p:spPr>
+          <a:xfrm>
+            <a:off x="5750300" y="1440125"/>
+            <a:ext cx="2248800" cy="1060200"/>
+          </a:xfrm>
+          <a:prstGeom prst="rect">
+            <a:avLst/>
+          </a:prstGeom>
+          <a:noFill/>
+          <a:ln cap="flat" cmpd="sng" w="9525">
+            <a:solidFill>
+              <a:srgbClr val="00FF00"/>
+            </a:solidFill>
+            <a:prstDash val="solid"/>
+            <a:round/>
+            <a:headEnd len="sm" w="sm" type="none"/>
+            <a:tailEnd len="sm" w="sm" type="none"/>
+          </a:ln>
+        </p:spPr>
+        <p:txBody>
+          <a:bodyPr anchorCtr="0" anchor="ctr" bIns="91425" lIns="91425" spcFirstLastPara="1" rIns="91425" wrap="square" tIns="91425">
+            <a:noAutofit/>
+          </a:bodyPr>
+          <a:lstStyle/>
+          <a:p>
+            <a:pPr indent="0" lvl="0" marL="0" rtl="0" algn="ctr">
+              <a:spcBef>
+                <a:spcPts val="0"/>
+              </a:spcBef>
+              <a:spcAft>
+                <a:spcPts val="0"/>
+              </a:spcAft>
+              <a:buNone/>
+            </a:pPr>
+            <a:r>
+              <a:t/>
+            </a:r>
+            <a:endParaRPr/>
+          </a:p>
+        </p:txBody>
+      </p:sp>
     </p:spTree>
   </p:cSld>
   <p:clrMapOvr>
@@ -11637,6 +12165,285 @@
 </file>
 
 <file path=ppt/theme/theme1.xml><?xml version="1.0" encoding="utf-8"?>
+<a:theme xmlns:a="http://schemas.openxmlformats.org/drawingml/2006/main" xmlns:r="http://schemas.openxmlformats.org/officeDocument/2006/relationships" name="Simple Light">
+  <a:themeElements>
+    <a:clrScheme name="Simple Light">
+      <a:dk1>
+        <a:srgbClr val="000000"/>
+      </a:dk1>
+      <a:lt1>
+        <a:srgbClr val="FFFFFF"/>
+      </a:lt1>
+      <a:dk2>
+        <a:srgbClr val="595959"/>
+      </a:dk2>
+      <a:lt2>
+        <a:srgbClr val="EEEEEE"/>
+      </a:lt2>
+      <a:accent1>
+        <a:srgbClr val="4285F4"/>
+      </a:accent1>
+      <a:accent2>
+        <a:srgbClr val="212121"/>
+      </a:accent2>
+      <a:accent3>
+        <a:srgbClr val="78909C"/>
+      </a:accent3>
+      <a:accent4>
+        <a:srgbClr val="FFAB40"/>
+      </a:accent4>
+      <a:accent5>
+        <a:srgbClr val="0097A7"/>
+      </a:accent5>
+      <a:accent6>
+        <a:srgbClr val="EEFF41"/>
+      </a:accent6>
+      <a:hlink>
+        <a:srgbClr val="0097A7"/>
+      </a:hlink>
+      <a:folHlink>
+        <a:srgbClr val="0097A7"/>
+      </a:folHlink>
+    </a:clrScheme>
+    <a:fontScheme name="Office">
+      <a:majorFont>
+        <a:latin typeface="Arial"/>
+        <a:ea typeface=""/>
+        <a:cs typeface=""/>
+        <a:font script="Jpan" typeface="ＭＳ Ｐゴシック"/>
+        <a:font script="Hang" typeface="맑은 고딕"/>
+        <a:font script="Hans" typeface="宋体"/>
+        <a:font script="Hant" typeface="新細明體"/>
+        <a:font script="Arab" typeface="Times New Roman"/>
+        <a:font script="Hebr" typeface="Times New Roman"/>
+        <a:font script="Thai" typeface="Angsana New"/>
+        <a:font script="Ethi" typeface="Nyala"/>
+        <a:font script="Beng" typeface="Vrinda"/>
+        <a:font script="Gujr" typeface="Shruti"/>
+        <a:font script="Khmr" typeface="MoolBoran"/>
+        <a:font script="Knda" typeface="Tunga"/>
+        <a:font script="Guru" typeface="Raavi"/>
+        <a:font script="Cans" typeface="Euphemia"/>
+        <a:font script="Cher" typeface="Plantagenet Cherokee"/>
+        <a:font script="Yiii" typeface="Microsoft Yi Baiti"/>
+        <a:font script="Tibt" typeface="Microsoft Himalaya"/>
+        <a:font script="Thaa" typeface="MV Boli"/>
+        <a:font script="Deva" typeface="Mangal"/>
+        <a:font script="Telu" typeface="Gautami"/>
+        <a:font script="Taml" typeface="Latha"/>
+        <a:font script="Syrc" typeface="Estrangelo Edessa"/>
+        <a:font script="Orya" typeface="Kalinga"/>
+        <a:font script="Mlym" typeface="Kartika"/>
+        <a:font script="Laoo" typeface="DokChampa"/>
+        <a:font script="Sinh" typeface="Iskoola Pota"/>
+        <a:font script="Mong" typeface="Mongolian Baiti"/>
+        <a:font script="Viet" typeface="Times New Roman"/>
+        <a:font script="Uigh" typeface="Microsoft Uighur"/>
+        <a:font script="Geor" typeface="Sylfaen"/>
+      </a:majorFont>
+      <a:minorFont>
+        <a:latin typeface="Arial"/>
+        <a:ea typeface=""/>
+        <a:cs typeface=""/>
+        <a:font script="Jpan" typeface="ＭＳ Ｐゴシック"/>
+        <a:font script="Hang" typeface="맑은 고딕"/>
+        <a:font script="Hans" typeface="宋体"/>
+        <a:font script="Hant" typeface="新細明體"/>
+        <a:font script="Arab" typeface="Arial"/>
+        <a:font script="Hebr" typeface="Arial"/>
+        <a:font script="Thai" typeface="Cordia New"/>
+        <a:font script="Ethi" typeface="Nyala"/>
+        <a:font script="Beng" typeface="Vrinda"/>
+        <a:font script="Gujr" typeface="Shruti"/>
+        <a:font script="Khmr" typeface="DaunPenh"/>
+        <a:font script="Knda" typeface="Tunga"/>
+        <a:font script="Guru" typeface="Raavi"/>
+        <a:font script="Cans" typeface="Euphemia"/>
+        <a:font script="Cher" typeface="Plantagenet Cherokee"/>
+        <a:font script="Yiii" typeface="Microsoft Yi Baiti"/>
+        <a:font script="Tibt" typeface="Microsoft Himalaya"/>
+        <a:font script="Thaa" typeface="MV Boli"/>
+        <a:font script="Deva" typeface="Mangal"/>
+        <a:font script="Telu" typeface="Gautami"/>
+        <a:font script="Taml" typeface="Latha"/>
+        <a:font script="Syrc" typeface="Estrangelo Edessa"/>
+        <a:font script="Orya" typeface="Kalinga"/>
+        <a:font script="Mlym" typeface="Kartika"/>
+        <a:font script="Laoo" typeface="DokChampa"/>
+        <a:font script="Sinh" typeface="Iskoola Pota"/>
+        <a:font script="Mong" typeface="Mongolian Baiti"/>
+        <a:font script="Viet" typeface="Arial"/>
+        <a:font script="Uigh" typeface="Microsoft Uighur"/>
+        <a:font script="Geor" typeface="Sylfaen"/>
+      </a:minorFont>
+    </a:fontScheme>
+    <a:fmtScheme name="Office">
+      <a:fillStyleLst>
+        <a:solidFill>
+          <a:schemeClr val="phClr"/>
+        </a:solidFill>
+        <a:gradFill rotWithShape="1">
+          <a:gsLst>
+            <a:gs pos="0">
+              <a:schemeClr val="phClr">
+                <a:tint val="50000"/>
+                <a:satMod val="300000"/>
+              </a:schemeClr>
+            </a:gs>
+            <a:gs pos="35000">
+              <a:schemeClr val="phClr">
+                <a:tint val="37000"/>
+                <a:satMod val="300000"/>
+              </a:schemeClr>
+            </a:gs>
+            <a:gs pos="100000">
+              <a:schemeClr val="phClr">
+                <a:tint val="15000"/>
+                <a:satMod val="350000"/>
+              </a:schemeClr>
+            </a:gs>
+          </a:gsLst>
+          <a:lin ang="16200000" scaled="1"/>
+        </a:gradFill>
+        <a:gradFill rotWithShape="1">
+          <a:gsLst>
+            <a:gs pos="0">
+              <a:schemeClr val="phClr">
+                <a:tint val="100000"/>
+                <a:shade val="100000"/>
+                <a:satMod val="130000"/>
+              </a:schemeClr>
+            </a:gs>
+            <a:gs pos="100000">
+              <a:schemeClr val="phClr">
+                <a:tint val="50000"/>
+                <a:shade val="100000"/>
+                <a:satMod val="350000"/>
+              </a:schemeClr>
+            </a:gs>
+          </a:gsLst>
+          <a:lin ang="16200000" scaled="0"/>
+        </a:gradFill>
+      </a:fillStyleLst>
+      <a:lnStyleLst>
+        <a:ln w="9525" cap="flat" cmpd="sng" algn="ctr">
+          <a:solidFill>
+            <a:schemeClr val="phClr">
+              <a:shade val="95000"/>
+              <a:satMod val="105000"/>
+            </a:schemeClr>
+          </a:solidFill>
+          <a:prstDash val="solid"/>
+        </a:ln>
+        <a:ln w="25400" cap="flat" cmpd="sng" algn="ctr">
+          <a:solidFill>
+            <a:schemeClr val="phClr"/>
+          </a:solidFill>
+          <a:prstDash val="solid"/>
+        </a:ln>
+        <a:ln w="38100" cap="flat" cmpd="sng" algn="ctr">
+          <a:solidFill>
+            <a:schemeClr val="phClr"/>
+          </a:solidFill>
+          <a:prstDash val="solid"/>
+        </a:ln>
+      </a:lnStyleLst>
+      <a:effectStyleLst>
+        <a:effectStyle>
+          <a:effectLst>
+            <a:outerShdw blurRad="40000" dist="20000" dir="5400000" rotWithShape="0">
+              <a:srgbClr val="000000">
+                <a:alpha val="38000"/>
+              </a:srgbClr>
+            </a:outerShdw>
+          </a:effectLst>
+        </a:effectStyle>
+        <a:effectStyle>
+          <a:effectLst>
+            <a:outerShdw blurRad="40000" dist="23000" dir="5400000" rotWithShape="0">
+              <a:srgbClr val="000000">
+                <a:alpha val="35000"/>
+              </a:srgbClr>
+            </a:outerShdw>
+          </a:effectLst>
+        </a:effectStyle>
+        <a:effectStyle>
+          <a:effectLst>
+            <a:outerShdw blurRad="40000" dist="23000" dir="5400000" rotWithShape="0">
+              <a:srgbClr val="000000">
+                <a:alpha val="35000"/>
+              </a:srgbClr>
+            </a:outerShdw>
+          </a:effectLst>
+          <a:scene3d>
+            <a:camera prst="orthographicFront">
+              <a:rot lat="0" lon="0" rev="0"/>
+            </a:camera>
+            <a:lightRig rig="threePt" dir="t">
+              <a:rot lat="0" lon="0" rev="1200000"/>
+            </a:lightRig>
+          </a:scene3d>
+          <a:sp3d>
+            <a:bevelT w="63500" h="25400"/>
+          </a:sp3d>
+        </a:effectStyle>
+      </a:effectStyleLst>
+      <a:bgFillStyleLst>
+        <a:solidFill>
+          <a:schemeClr val="phClr"/>
+        </a:solidFill>
+        <a:gradFill rotWithShape="1">
+          <a:gsLst>
+            <a:gs pos="0">
+              <a:schemeClr val="phClr">
+                <a:tint val="40000"/>
+                <a:satMod val="350000"/>
+              </a:schemeClr>
+            </a:gs>
+            <a:gs pos="40000">
+              <a:schemeClr val="phClr">
+                <a:tint val="45000"/>
+                <a:shade val="99000"/>
+                <a:satMod val="350000"/>
+              </a:schemeClr>
+            </a:gs>
+            <a:gs pos="100000">
+              <a:schemeClr val="phClr">
+                <a:shade val="20000"/>
+                <a:satMod val="255000"/>
+              </a:schemeClr>
+            </a:gs>
+          </a:gsLst>
+          <a:path path="circle">
+            <a:fillToRect l="50000" t="-80000" r="50000" b="180000"/>
+          </a:path>
+        </a:gradFill>
+        <a:gradFill rotWithShape="1">
+          <a:gsLst>
+            <a:gs pos="0">
+              <a:schemeClr val="phClr">
+                <a:tint val="80000"/>
+                <a:satMod val="300000"/>
+              </a:schemeClr>
+            </a:gs>
+            <a:gs pos="100000">
+              <a:schemeClr val="phClr">
+                <a:shade val="30000"/>
+                <a:satMod val="200000"/>
+              </a:schemeClr>
+            </a:gs>
+          </a:gsLst>
+          <a:path path="circle">
+            <a:fillToRect l="50000" t="50000" r="50000" b="50000"/>
+          </a:path>
+        </a:gradFill>
+      </a:bgFillStyleLst>
+    </a:fmtScheme>
+  </a:themeElements>
+</a:theme>
+</file>
+
+<file path=ppt/theme/theme2.xml><?xml version="1.0" encoding="utf-8"?>
 <a:theme xmlns:a="http://schemas.openxmlformats.org/drawingml/2006/main" xmlns:r="http://schemas.openxmlformats.org/officeDocument/2006/relationships">
   <a:themeElements>
     <a:clrScheme name="Default">
@@ -11913,283 +12720,4 @@
     </a:fmtScheme>
   </a:themeElements>
 </a:theme>
-</file>
-
-<file path=ppt/theme/theme2.xml><?xml version="1.0" encoding="utf-8"?>
-<a:theme xmlns:a="http://schemas.openxmlformats.org/drawingml/2006/main" xmlns:r="http://schemas.openxmlformats.org/officeDocument/2006/relationships" name="Simple Light">
-  <a:themeElements>
-    <a:clrScheme name="Simple Light">
-      <a:dk1>
-        <a:srgbClr val="000000"/>
-      </a:dk1>
-      <a:lt1>
-        <a:srgbClr val="FFFFFF"/>
-      </a:lt1>
-      <a:dk2>
-        <a:srgbClr val="595959"/>
-      </a:dk2>
-      <a:lt2>
-        <a:srgbClr val="EEEEEE"/>
-      </a:lt2>
-      <a:accent1>
-        <a:srgbClr val="4285F4"/>
-      </a:accent1>
-      <a:accent2>
-        <a:srgbClr val="212121"/>
-      </a:accent2>
-      <a:accent3>
-        <a:srgbClr val="78909C"/>
-      </a:accent3>
-      <a:accent4>
-        <a:srgbClr val="FFAB40"/>
-      </a:accent4>
-      <a:accent5>
-        <a:srgbClr val="0097A7"/>
-      </a:accent5>
-      <a:accent6>
-        <a:srgbClr val="EEFF41"/>
-      </a:accent6>
-      <a:hlink>
-        <a:srgbClr val="0097A7"/>
-      </a:hlink>
-      <a:folHlink>
-        <a:srgbClr val="0097A7"/>
-      </a:folHlink>
-    </a:clrScheme>
-    <a:fontScheme name="Office">
-      <a:majorFont>
-        <a:latin typeface="Arial"/>
-        <a:ea typeface=""/>
-        <a:cs typeface=""/>
-        <a:font script="Jpan" typeface="ＭＳ Ｐゴシック"/>
-        <a:font script="Hang" typeface="맑은 고딕"/>
-        <a:font script="Hans" typeface="宋体"/>
-        <a:font script="Hant" typeface="新細明體"/>
-        <a:font script="Arab" typeface="Times New Roman"/>
-        <a:font script="Hebr" typeface="Times New Roman"/>
-        <a:font script="Thai" typeface="Angsana New"/>
-        <a:font script="Ethi" typeface="Nyala"/>
-        <a:font script="Beng" typeface="Vrinda"/>
-        <a:font script="Gujr" typeface="Shruti"/>
-        <a:font script="Khmr" typeface="MoolBoran"/>
-        <a:font script="Knda" typeface="Tunga"/>
-        <a:font script="Guru" typeface="Raavi"/>
-        <a:font script="Cans" typeface="Euphemia"/>
-        <a:font script="Cher" typeface="Plantagenet Cherokee"/>
-        <a:font script="Yiii" typeface="Microsoft Yi Baiti"/>
-        <a:font script="Tibt" typeface="Microsoft Himalaya"/>
-        <a:font script="Thaa" typeface="MV Boli"/>
-        <a:font script="Deva" typeface="Mangal"/>
-        <a:font script="Telu" typeface="Gautami"/>
-        <a:font script="Taml" typeface="Latha"/>
-        <a:font script="Syrc" typeface="Estrangelo Edessa"/>
-        <a:font script="Orya" typeface="Kalinga"/>
-        <a:font script="Mlym" typeface="Kartika"/>
-        <a:font script="Laoo" typeface="DokChampa"/>
-        <a:font script="Sinh" typeface="Iskoola Pota"/>
-        <a:font script="Mong" typeface="Mongolian Baiti"/>
-        <a:font script="Viet" typeface="Times New Roman"/>
-        <a:font script="Uigh" typeface="Microsoft Uighur"/>
-        <a:font script="Geor" typeface="Sylfaen"/>
-      </a:majorFont>
-      <a:minorFont>
-        <a:latin typeface="Arial"/>
-        <a:ea typeface=""/>
-        <a:cs typeface=""/>
-        <a:font script="Jpan" typeface="ＭＳ Ｐゴシック"/>
-        <a:font script="Hang" typeface="맑은 고딕"/>
-        <a:font script="Hans" typeface="宋体"/>
-        <a:font script="Hant" typeface="新細明體"/>
-        <a:font script="Arab" typeface="Arial"/>
-        <a:font script="Hebr" typeface="Arial"/>
-        <a:font script="Thai" typeface="Cordia New"/>
-        <a:font script="Ethi" typeface="Nyala"/>
-        <a:font script="Beng" typeface="Vrinda"/>
-        <a:font script="Gujr" typeface="Shruti"/>
-        <a:font script="Khmr" typeface="DaunPenh"/>
-        <a:font script="Knda" typeface="Tunga"/>
-        <a:font script="Guru" typeface="Raavi"/>
-        <a:font script="Cans" typeface="Euphemia"/>
-        <a:font script="Cher" typeface="Plantagenet Cherokee"/>
-        <a:font script="Yiii" typeface="Microsoft Yi Baiti"/>
-        <a:font script="Tibt" typeface="Microsoft Himalaya"/>
-        <a:font script="Thaa" typeface="MV Boli"/>
-        <a:font script="Deva" typeface="Mangal"/>
-        <a:font script="Telu" typeface="Gautami"/>
-        <a:font script="Taml" typeface="Latha"/>
-        <a:font script="Syrc" typeface="Estrangelo Edessa"/>
-        <a:font script="Orya" typeface="Kalinga"/>
-        <a:font script="Mlym" typeface="Kartika"/>
-        <a:font script="Laoo" typeface="DokChampa"/>
-        <a:font script="Sinh" typeface="Iskoola Pota"/>
-        <a:font script="Mong" typeface="Mongolian Baiti"/>
-        <a:font script="Viet" typeface="Arial"/>
-        <a:font script="Uigh" typeface="Microsoft Uighur"/>
-        <a:font script="Geor" typeface="Sylfaen"/>
-      </a:minorFont>
-    </a:fontScheme>
-    <a:fmtScheme name="Office">
-      <a:fillStyleLst>
-        <a:solidFill>
-          <a:schemeClr val="phClr"/>
-        </a:solidFill>
-        <a:gradFill rotWithShape="1">
-          <a:gsLst>
-            <a:gs pos="0">
-              <a:schemeClr val="phClr">
-                <a:tint val="50000"/>
-                <a:satMod val="300000"/>
-              </a:schemeClr>
-            </a:gs>
-            <a:gs pos="35000">
-              <a:schemeClr val="phClr">
-                <a:tint val="37000"/>
-                <a:satMod val="300000"/>
-              </a:schemeClr>
-            </a:gs>
-            <a:gs pos="100000">
-              <a:schemeClr val="phClr">
-                <a:tint val="15000"/>
-                <a:satMod val="350000"/>
-              </a:schemeClr>
-            </a:gs>
-          </a:gsLst>
-          <a:lin ang="16200000" scaled="1"/>
-        </a:gradFill>
-        <a:gradFill rotWithShape="1">
-          <a:gsLst>
-            <a:gs pos="0">
-              <a:schemeClr val="phClr">
-                <a:tint val="100000"/>
-                <a:shade val="100000"/>
-                <a:satMod val="130000"/>
-              </a:schemeClr>
-            </a:gs>
-            <a:gs pos="100000">
-              <a:schemeClr val="phClr">
-                <a:tint val="50000"/>
-                <a:shade val="100000"/>
-                <a:satMod val="350000"/>
-              </a:schemeClr>
-            </a:gs>
-          </a:gsLst>
-          <a:lin ang="16200000" scaled="0"/>
-        </a:gradFill>
-      </a:fillStyleLst>
-      <a:lnStyleLst>
-        <a:ln w="9525" cap="flat" cmpd="sng" algn="ctr">
-          <a:solidFill>
-            <a:schemeClr val="phClr">
-              <a:shade val="95000"/>
-              <a:satMod val="105000"/>
-            </a:schemeClr>
-          </a:solidFill>
-          <a:prstDash val="solid"/>
-        </a:ln>
-        <a:ln w="25400" cap="flat" cmpd="sng" algn="ctr">
-          <a:solidFill>
-            <a:schemeClr val="phClr"/>
-          </a:solidFill>
-          <a:prstDash val="solid"/>
-        </a:ln>
-        <a:ln w="38100" cap="flat" cmpd="sng" algn="ctr">
-          <a:solidFill>
-            <a:schemeClr val="phClr"/>
-          </a:solidFill>
-          <a:prstDash val="solid"/>
-        </a:ln>
-      </a:lnStyleLst>
-      <a:effectStyleLst>
-        <a:effectStyle>
-          <a:effectLst>
-            <a:outerShdw blurRad="40000" dist="20000" dir="5400000" rotWithShape="0">
-              <a:srgbClr val="000000">
-                <a:alpha val="38000"/>
-              </a:srgbClr>
-            </a:outerShdw>
-          </a:effectLst>
-        </a:effectStyle>
-        <a:effectStyle>
-          <a:effectLst>
-            <a:outerShdw blurRad="40000" dist="23000" dir="5400000" rotWithShape="0">
-              <a:srgbClr val="000000">
-                <a:alpha val="35000"/>
-              </a:srgbClr>
-            </a:outerShdw>
-          </a:effectLst>
-        </a:effectStyle>
-        <a:effectStyle>
-          <a:effectLst>
-            <a:outerShdw blurRad="40000" dist="23000" dir="5400000" rotWithShape="0">
-              <a:srgbClr val="000000">
-                <a:alpha val="35000"/>
-              </a:srgbClr>
-            </a:outerShdw>
-          </a:effectLst>
-          <a:scene3d>
-            <a:camera prst="orthographicFront">
-              <a:rot lat="0" lon="0" rev="0"/>
-            </a:camera>
-            <a:lightRig rig="threePt" dir="t">
-              <a:rot lat="0" lon="0" rev="1200000"/>
-            </a:lightRig>
-          </a:scene3d>
-          <a:sp3d>
-            <a:bevelT w="63500" h="25400"/>
-          </a:sp3d>
-        </a:effectStyle>
-      </a:effectStyleLst>
-      <a:bgFillStyleLst>
-        <a:solidFill>
-          <a:schemeClr val="phClr"/>
-        </a:solidFill>
-        <a:gradFill rotWithShape="1">
-          <a:gsLst>
-            <a:gs pos="0">
-              <a:schemeClr val="phClr">
-                <a:tint val="40000"/>
-                <a:satMod val="350000"/>
-              </a:schemeClr>
-            </a:gs>
-            <a:gs pos="40000">
-              <a:schemeClr val="phClr">
-                <a:tint val="45000"/>
-                <a:shade val="99000"/>
-                <a:satMod val="350000"/>
-              </a:schemeClr>
-            </a:gs>
-            <a:gs pos="100000">
-              <a:schemeClr val="phClr">
-                <a:shade val="20000"/>
-                <a:satMod val="255000"/>
-              </a:schemeClr>
-            </a:gs>
-          </a:gsLst>
-          <a:path path="circle">
-            <a:fillToRect l="50000" t="-80000" r="50000" b="180000"/>
-          </a:path>
-        </a:gradFill>
-        <a:gradFill rotWithShape="1">
-          <a:gsLst>
-            <a:gs pos="0">
-              <a:schemeClr val="phClr">
-                <a:tint val="80000"/>
-                <a:satMod val="300000"/>
-              </a:schemeClr>
-            </a:gs>
-            <a:gs pos="100000">
-              <a:schemeClr val="phClr">
-                <a:shade val="30000"/>
-                <a:satMod val="200000"/>
-              </a:schemeClr>
-            </a:gs>
-          </a:gsLst>
-          <a:path path="circle">
-            <a:fillToRect l="50000" t="50000" r="50000" b="50000"/>
-          </a:path>
-        </a:gradFill>
-      </a:bgFillStyleLst>
-    </a:fmtScheme>
-  </a:themeElements>
-</a:theme>
 </file>
</xml_diff>